<commit_message>
Ajustei na forma do ppt
</commit_message>
<xml_diff>
--- a/ProjetoFinal_Avaliacao_de_Cafes.pptx
+++ b/ProjetoFinal_Avaliacao_de_Cafes.pptx
@@ -109,6 +109,11 @@
       </a:defRPr>
     </a:lvl9pPr>
   </p:defaultTextStyle>
+  <p:extLst>
+    <p:ext uri="{EFAFB233-063F-42B5-8137-9DF3F51BA10A}">
+      <p15:sldGuideLst xmlns:p15="http://schemas.microsoft.com/office/powerpoint/2012/main"/>
+    </p:ext>
+  </p:extLst>
 </p:presentation>
 </file>
 
@@ -150,6 +155,9 @@
             <a:off x="1524000" y="1122363"/>
             <a:ext cx="9144000" cy="2387600"/>
           </a:xfrm>
+          <a:prstGeom prst="rect">
+            <a:avLst/>
+          </a:prstGeom>
         </p:spPr>
         <p:txBody>
           <a:bodyPr anchor="b"/>
@@ -187,6 +195,9 @@
             <a:off x="1524000" y="3602038"/>
             <a:ext cx="9144000" cy="1655762"/>
           </a:xfrm>
+          <a:prstGeom prst="rect">
+            <a:avLst/>
+          </a:prstGeom>
         </p:spPr>
         <p:txBody>
           <a:bodyPr/>
@@ -252,14 +263,22 @@
             <p:ph type="dt" sz="half" idx="10"/>
           </p:nvPr>
         </p:nvSpPr>
-        <p:spPr/>
+        <p:spPr>
+          <a:xfrm>
+            <a:off x="838200" y="6356350"/>
+            <a:ext cx="2743200" cy="365125"/>
+          </a:xfrm>
+          <a:prstGeom prst="rect">
+            <a:avLst/>
+          </a:prstGeom>
+        </p:spPr>
         <p:txBody>
           <a:bodyPr/>
           <a:lstStyle/>
           <a:p>
             <a:fld id="{98ECE280-531B-476A-B9D6-EEB79A6A7E2D}" type="datetimeFigureOut">
               <a:rPr lang="pt-BR" smtClean="0"/>
-              <a:t>20/11/2023</a:t>
+              <a:t>21/11/2023</a:t>
             </a:fld>
             <a:endParaRPr lang="pt-BR"/>
           </a:p>
@@ -281,7 +300,15 @@
             <p:ph type="ftr" sz="quarter" idx="11"/>
           </p:nvPr>
         </p:nvSpPr>
-        <p:spPr/>
+        <p:spPr>
+          <a:xfrm>
+            <a:off x="4038600" y="6356350"/>
+            <a:ext cx="4114800" cy="365125"/>
+          </a:xfrm>
+          <a:prstGeom prst="rect">
+            <a:avLst/>
+          </a:prstGeom>
+        </p:spPr>
         <p:txBody>
           <a:bodyPr/>
           <a:lstStyle/>
@@ -306,7 +333,15 @@
             <p:ph type="sldNum" sz="quarter" idx="12"/>
           </p:nvPr>
         </p:nvSpPr>
-        <p:spPr/>
+        <p:spPr>
+          <a:xfrm>
+            <a:off x="8610600" y="6356350"/>
+            <a:ext cx="2743200" cy="365125"/>
+          </a:xfrm>
+          <a:prstGeom prst="rect">
+            <a:avLst/>
+          </a:prstGeom>
+        </p:spPr>
         <p:txBody>
           <a:bodyPr/>
           <a:lstStyle/>
@@ -365,7 +400,15 @@
             <p:ph type="title"/>
           </p:nvPr>
         </p:nvSpPr>
-        <p:spPr/>
+        <p:spPr>
+          <a:xfrm>
+            <a:off x="838200" y="365125"/>
+            <a:ext cx="10515600" cy="1325563"/>
+          </a:xfrm>
+          <a:prstGeom prst="rect">
+            <a:avLst/>
+          </a:prstGeom>
+        </p:spPr>
         <p:txBody>
           <a:bodyPr/>
           <a:lstStyle/>
@@ -393,7 +436,15 @@
             <p:ph type="body" orient="vert" idx="1"/>
           </p:nvPr>
         </p:nvSpPr>
-        <p:spPr/>
+        <p:spPr>
+          <a:xfrm>
+            <a:off x="838200" y="1825625"/>
+            <a:ext cx="10515600" cy="4351338"/>
+          </a:xfrm>
+          <a:prstGeom prst="rect">
+            <a:avLst/>
+          </a:prstGeom>
+        </p:spPr>
         <p:txBody>
           <a:bodyPr vert="eaVert"/>
           <a:lstStyle/>
@@ -450,14 +501,22 @@
             <p:ph type="dt" sz="half" idx="10"/>
           </p:nvPr>
         </p:nvSpPr>
-        <p:spPr/>
+        <p:spPr>
+          <a:xfrm>
+            <a:off x="838200" y="6356350"/>
+            <a:ext cx="2743200" cy="365125"/>
+          </a:xfrm>
+          <a:prstGeom prst="rect">
+            <a:avLst/>
+          </a:prstGeom>
+        </p:spPr>
         <p:txBody>
           <a:bodyPr/>
           <a:lstStyle/>
           <a:p>
             <a:fld id="{98ECE280-531B-476A-B9D6-EEB79A6A7E2D}" type="datetimeFigureOut">
               <a:rPr lang="pt-BR" smtClean="0"/>
-              <a:t>20/11/2023</a:t>
+              <a:t>21/11/2023</a:t>
             </a:fld>
             <a:endParaRPr lang="pt-BR"/>
           </a:p>
@@ -479,7 +538,15 @@
             <p:ph type="ftr" sz="quarter" idx="11"/>
           </p:nvPr>
         </p:nvSpPr>
-        <p:spPr/>
+        <p:spPr>
+          <a:xfrm>
+            <a:off x="4038600" y="6356350"/>
+            <a:ext cx="4114800" cy="365125"/>
+          </a:xfrm>
+          <a:prstGeom prst="rect">
+            <a:avLst/>
+          </a:prstGeom>
+        </p:spPr>
         <p:txBody>
           <a:bodyPr/>
           <a:lstStyle/>
@@ -504,7 +571,15 @@
             <p:ph type="sldNum" sz="quarter" idx="12"/>
           </p:nvPr>
         </p:nvSpPr>
-        <p:spPr/>
+        <p:spPr>
+          <a:xfrm>
+            <a:off x="8610600" y="6356350"/>
+            <a:ext cx="2743200" cy="365125"/>
+          </a:xfrm>
+          <a:prstGeom prst="rect">
+            <a:avLst/>
+          </a:prstGeom>
+        </p:spPr>
         <p:txBody>
           <a:bodyPr/>
           <a:lstStyle/>
@@ -568,6 +643,9 @@
             <a:off x="8724900" y="365125"/>
             <a:ext cx="2628900" cy="5811838"/>
           </a:xfrm>
+          <a:prstGeom prst="rect">
+            <a:avLst/>
+          </a:prstGeom>
         </p:spPr>
         <p:txBody>
           <a:bodyPr vert="eaVert"/>
@@ -601,6 +679,9 @@
             <a:off x="838200" y="365125"/>
             <a:ext cx="7734300" cy="5811838"/>
           </a:xfrm>
+          <a:prstGeom prst="rect">
+            <a:avLst/>
+          </a:prstGeom>
         </p:spPr>
         <p:txBody>
           <a:bodyPr vert="eaVert"/>
@@ -658,14 +739,22 @@
             <p:ph type="dt" sz="half" idx="10"/>
           </p:nvPr>
         </p:nvSpPr>
-        <p:spPr/>
+        <p:spPr>
+          <a:xfrm>
+            <a:off x="838200" y="6356350"/>
+            <a:ext cx="2743200" cy="365125"/>
+          </a:xfrm>
+          <a:prstGeom prst="rect">
+            <a:avLst/>
+          </a:prstGeom>
+        </p:spPr>
         <p:txBody>
           <a:bodyPr/>
           <a:lstStyle/>
           <a:p>
             <a:fld id="{98ECE280-531B-476A-B9D6-EEB79A6A7E2D}" type="datetimeFigureOut">
               <a:rPr lang="pt-BR" smtClean="0"/>
-              <a:t>20/11/2023</a:t>
+              <a:t>21/11/2023</a:t>
             </a:fld>
             <a:endParaRPr lang="pt-BR"/>
           </a:p>
@@ -687,7 +776,15 @@
             <p:ph type="ftr" sz="quarter" idx="11"/>
           </p:nvPr>
         </p:nvSpPr>
-        <p:spPr/>
+        <p:spPr>
+          <a:xfrm>
+            <a:off x="4038600" y="6356350"/>
+            <a:ext cx="4114800" cy="365125"/>
+          </a:xfrm>
+          <a:prstGeom prst="rect">
+            <a:avLst/>
+          </a:prstGeom>
+        </p:spPr>
         <p:txBody>
           <a:bodyPr/>
           <a:lstStyle/>
@@ -712,7 +809,15 @@
             <p:ph type="sldNum" sz="quarter" idx="12"/>
           </p:nvPr>
         </p:nvSpPr>
-        <p:spPr/>
+        <p:spPr>
+          <a:xfrm>
+            <a:off x="8610600" y="6356350"/>
+            <a:ext cx="2743200" cy="365125"/>
+          </a:xfrm>
+          <a:prstGeom prst="rect">
+            <a:avLst/>
+          </a:prstGeom>
+        </p:spPr>
         <p:txBody>
           <a:bodyPr/>
           <a:lstStyle/>
@@ -771,7 +876,15 @@
             <p:ph type="title"/>
           </p:nvPr>
         </p:nvSpPr>
-        <p:spPr/>
+        <p:spPr>
+          <a:xfrm>
+            <a:off x="838200" y="365125"/>
+            <a:ext cx="10515600" cy="1325563"/>
+          </a:xfrm>
+          <a:prstGeom prst="rect">
+            <a:avLst/>
+          </a:prstGeom>
+        </p:spPr>
         <p:txBody>
           <a:bodyPr/>
           <a:lstStyle/>
@@ -799,7 +912,15 @@
             <p:ph idx="1"/>
           </p:nvPr>
         </p:nvSpPr>
-        <p:spPr/>
+        <p:spPr>
+          <a:xfrm>
+            <a:off x="838200" y="1825625"/>
+            <a:ext cx="10515600" cy="4351338"/>
+          </a:xfrm>
+          <a:prstGeom prst="rect">
+            <a:avLst/>
+          </a:prstGeom>
+        </p:spPr>
         <p:txBody>
           <a:bodyPr/>
           <a:lstStyle/>
@@ -856,14 +977,22 @@
             <p:ph type="dt" sz="half" idx="10"/>
           </p:nvPr>
         </p:nvSpPr>
-        <p:spPr/>
+        <p:spPr>
+          <a:xfrm>
+            <a:off x="838200" y="6356350"/>
+            <a:ext cx="2743200" cy="365125"/>
+          </a:xfrm>
+          <a:prstGeom prst="rect">
+            <a:avLst/>
+          </a:prstGeom>
+        </p:spPr>
         <p:txBody>
           <a:bodyPr/>
           <a:lstStyle/>
           <a:p>
             <a:fld id="{98ECE280-531B-476A-B9D6-EEB79A6A7E2D}" type="datetimeFigureOut">
               <a:rPr lang="pt-BR" smtClean="0"/>
-              <a:t>20/11/2023</a:t>
+              <a:t>21/11/2023</a:t>
             </a:fld>
             <a:endParaRPr lang="pt-BR"/>
           </a:p>
@@ -885,7 +1014,15 @@
             <p:ph type="ftr" sz="quarter" idx="11"/>
           </p:nvPr>
         </p:nvSpPr>
-        <p:spPr/>
+        <p:spPr>
+          <a:xfrm>
+            <a:off x="4038600" y="6356350"/>
+            <a:ext cx="4114800" cy="365125"/>
+          </a:xfrm>
+          <a:prstGeom prst="rect">
+            <a:avLst/>
+          </a:prstGeom>
+        </p:spPr>
         <p:txBody>
           <a:bodyPr/>
           <a:lstStyle/>
@@ -910,7 +1047,15 @@
             <p:ph type="sldNum" sz="quarter" idx="12"/>
           </p:nvPr>
         </p:nvSpPr>
-        <p:spPr/>
+        <p:spPr>
+          <a:xfrm>
+            <a:off x="8610600" y="6356350"/>
+            <a:ext cx="2743200" cy="365125"/>
+          </a:xfrm>
+          <a:prstGeom prst="rect">
+            <a:avLst/>
+          </a:prstGeom>
+        </p:spPr>
         <p:txBody>
           <a:bodyPr/>
           <a:lstStyle/>
@@ -974,6 +1119,9 @@
             <a:off x="831850" y="1709738"/>
             <a:ext cx="10515600" cy="2852737"/>
           </a:xfrm>
+          <a:prstGeom prst="rect">
+            <a:avLst/>
+          </a:prstGeom>
         </p:spPr>
         <p:txBody>
           <a:bodyPr anchor="b"/>
@@ -1011,6 +1159,9 @@
             <a:off x="831850" y="4589463"/>
             <a:ext cx="10515600" cy="1500187"/>
           </a:xfrm>
+          <a:prstGeom prst="rect">
+            <a:avLst/>
+          </a:prstGeom>
         </p:spPr>
         <p:txBody>
           <a:bodyPr/>
@@ -1131,14 +1282,22 @@
             <p:ph type="dt" sz="half" idx="10"/>
           </p:nvPr>
         </p:nvSpPr>
-        <p:spPr/>
+        <p:spPr>
+          <a:xfrm>
+            <a:off x="838200" y="6356350"/>
+            <a:ext cx="2743200" cy="365125"/>
+          </a:xfrm>
+          <a:prstGeom prst="rect">
+            <a:avLst/>
+          </a:prstGeom>
+        </p:spPr>
         <p:txBody>
           <a:bodyPr/>
           <a:lstStyle/>
           <a:p>
             <a:fld id="{98ECE280-531B-476A-B9D6-EEB79A6A7E2D}" type="datetimeFigureOut">
               <a:rPr lang="pt-BR" smtClean="0"/>
-              <a:t>20/11/2023</a:t>
+              <a:t>21/11/2023</a:t>
             </a:fld>
             <a:endParaRPr lang="pt-BR"/>
           </a:p>
@@ -1160,7 +1319,15 @@
             <p:ph type="ftr" sz="quarter" idx="11"/>
           </p:nvPr>
         </p:nvSpPr>
-        <p:spPr/>
+        <p:spPr>
+          <a:xfrm>
+            <a:off x="4038600" y="6356350"/>
+            <a:ext cx="4114800" cy="365125"/>
+          </a:xfrm>
+          <a:prstGeom prst="rect">
+            <a:avLst/>
+          </a:prstGeom>
+        </p:spPr>
         <p:txBody>
           <a:bodyPr/>
           <a:lstStyle/>
@@ -1185,7 +1352,15 @@
             <p:ph type="sldNum" sz="quarter" idx="12"/>
           </p:nvPr>
         </p:nvSpPr>
-        <p:spPr/>
+        <p:spPr>
+          <a:xfrm>
+            <a:off x="8610600" y="6356350"/>
+            <a:ext cx="2743200" cy="365125"/>
+          </a:xfrm>
+          <a:prstGeom prst="rect">
+            <a:avLst/>
+          </a:prstGeom>
+        </p:spPr>
         <p:txBody>
           <a:bodyPr/>
           <a:lstStyle/>
@@ -1244,7 +1419,15 @@
             <p:ph type="title"/>
           </p:nvPr>
         </p:nvSpPr>
-        <p:spPr/>
+        <p:spPr>
+          <a:xfrm>
+            <a:off x="838200" y="365125"/>
+            <a:ext cx="10515600" cy="1325563"/>
+          </a:xfrm>
+          <a:prstGeom prst="rect">
+            <a:avLst/>
+          </a:prstGeom>
+        </p:spPr>
         <p:txBody>
           <a:bodyPr/>
           <a:lstStyle/>
@@ -1277,6 +1460,9 @@
             <a:off x="838200" y="1825625"/>
             <a:ext cx="5181600" cy="4351338"/>
           </a:xfrm>
+          <a:prstGeom prst="rect">
+            <a:avLst/>
+          </a:prstGeom>
         </p:spPr>
         <p:txBody>
           <a:bodyPr/>
@@ -1339,6 +1525,9 @@
             <a:off x="6172200" y="1825625"/>
             <a:ext cx="5181600" cy="4351338"/>
           </a:xfrm>
+          <a:prstGeom prst="rect">
+            <a:avLst/>
+          </a:prstGeom>
         </p:spPr>
         <p:txBody>
           <a:bodyPr/>
@@ -1396,14 +1585,22 @@
             <p:ph type="dt" sz="half" idx="10"/>
           </p:nvPr>
         </p:nvSpPr>
-        <p:spPr/>
+        <p:spPr>
+          <a:xfrm>
+            <a:off x="838200" y="6356350"/>
+            <a:ext cx="2743200" cy="365125"/>
+          </a:xfrm>
+          <a:prstGeom prst="rect">
+            <a:avLst/>
+          </a:prstGeom>
+        </p:spPr>
         <p:txBody>
           <a:bodyPr/>
           <a:lstStyle/>
           <a:p>
             <a:fld id="{98ECE280-531B-476A-B9D6-EEB79A6A7E2D}" type="datetimeFigureOut">
               <a:rPr lang="pt-BR" smtClean="0"/>
-              <a:t>20/11/2023</a:t>
+              <a:t>21/11/2023</a:t>
             </a:fld>
             <a:endParaRPr lang="pt-BR"/>
           </a:p>
@@ -1425,7 +1622,15 @@
             <p:ph type="ftr" sz="quarter" idx="11"/>
           </p:nvPr>
         </p:nvSpPr>
-        <p:spPr/>
+        <p:spPr>
+          <a:xfrm>
+            <a:off x="4038600" y="6356350"/>
+            <a:ext cx="4114800" cy="365125"/>
+          </a:xfrm>
+          <a:prstGeom prst="rect">
+            <a:avLst/>
+          </a:prstGeom>
+        </p:spPr>
         <p:txBody>
           <a:bodyPr/>
           <a:lstStyle/>
@@ -1450,7 +1655,15 @@
             <p:ph type="sldNum" sz="quarter" idx="12"/>
           </p:nvPr>
         </p:nvSpPr>
-        <p:spPr/>
+        <p:spPr>
+          <a:xfrm>
+            <a:off x="8610600" y="6356350"/>
+            <a:ext cx="2743200" cy="365125"/>
+          </a:xfrm>
+          <a:prstGeom prst="rect">
+            <a:avLst/>
+          </a:prstGeom>
+        </p:spPr>
         <p:txBody>
           <a:bodyPr/>
           <a:lstStyle/>
@@ -1514,6 +1727,9 @@
             <a:off x="839788" y="365125"/>
             <a:ext cx="10515600" cy="1325563"/>
           </a:xfrm>
+          <a:prstGeom prst="rect">
+            <a:avLst/>
+          </a:prstGeom>
         </p:spPr>
         <p:txBody>
           <a:bodyPr/>
@@ -1547,6 +1763,9 @@
             <a:off x="839788" y="1681163"/>
             <a:ext cx="5157787" cy="823912"/>
           </a:xfrm>
+          <a:prstGeom prst="rect">
+            <a:avLst/>
+          </a:prstGeom>
         </p:spPr>
         <p:txBody>
           <a:bodyPr anchor="b"/>
@@ -1618,6 +1837,9 @@
             <a:off x="839788" y="2505075"/>
             <a:ext cx="5157787" cy="3684588"/>
           </a:xfrm>
+          <a:prstGeom prst="rect">
+            <a:avLst/>
+          </a:prstGeom>
         </p:spPr>
         <p:txBody>
           <a:bodyPr/>
@@ -1680,6 +1902,9 @@
             <a:off x="6172200" y="1681163"/>
             <a:ext cx="5183188" cy="823912"/>
           </a:xfrm>
+          <a:prstGeom prst="rect">
+            <a:avLst/>
+          </a:prstGeom>
         </p:spPr>
         <p:txBody>
           <a:bodyPr anchor="b"/>
@@ -1751,6 +1976,9 @@
             <a:off x="6172200" y="2505075"/>
             <a:ext cx="5183188" cy="3684588"/>
           </a:xfrm>
+          <a:prstGeom prst="rect">
+            <a:avLst/>
+          </a:prstGeom>
         </p:spPr>
         <p:txBody>
           <a:bodyPr/>
@@ -1808,14 +2036,22 @@
             <p:ph type="dt" sz="half" idx="10"/>
           </p:nvPr>
         </p:nvSpPr>
-        <p:spPr/>
+        <p:spPr>
+          <a:xfrm>
+            <a:off x="838200" y="6356350"/>
+            <a:ext cx="2743200" cy="365125"/>
+          </a:xfrm>
+          <a:prstGeom prst="rect">
+            <a:avLst/>
+          </a:prstGeom>
+        </p:spPr>
         <p:txBody>
           <a:bodyPr/>
           <a:lstStyle/>
           <a:p>
             <a:fld id="{98ECE280-531B-476A-B9D6-EEB79A6A7E2D}" type="datetimeFigureOut">
               <a:rPr lang="pt-BR" smtClean="0"/>
-              <a:t>20/11/2023</a:t>
+              <a:t>21/11/2023</a:t>
             </a:fld>
             <a:endParaRPr lang="pt-BR"/>
           </a:p>
@@ -1837,7 +2073,15 @@
             <p:ph type="ftr" sz="quarter" idx="11"/>
           </p:nvPr>
         </p:nvSpPr>
-        <p:spPr/>
+        <p:spPr>
+          <a:xfrm>
+            <a:off x="4038600" y="6356350"/>
+            <a:ext cx="4114800" cy="365125"/>
+          </a:xfrm>
+          <a:prstGeom prst="rect">
+            <a:avLst/>
+          </a:prstGeom>
+        </p:spPr>
         <p:txBody>
           <a:bodyPr/>
           <a:lstStyle/>
@@ -1862,7 +2106,15 @@
             <p:ph type="sldNum" sz="quarter" idx="12"/>
           </p:nvPr>
         </p:nvSpPr>
-        <p:spPr/>
+        <p:spPr>
+          <a:xfrm>
+            <a:off x="8610600" y="6356350"/>
+            <a:ext cx="2743200" cy="365125"/>
+          </a:xfrm>
+          <a:prstGeom prst="rect">
+            <a:avLst/>
+          </a:prstGeom>
+        </p:spPr>
         <p:txBody>
           <a:bodyPr/>
           <a:lstStyle/>
@@ -1921,7 +2173,15 @@
             <p:ph type="title"/>
           </p:nvPr>
         </p:nvSpPr>
-        <p:spPr/>
+        <p:spPr>
+          <a:xfrm>
+            <a:off x="838200" y="365125"/>
+            <a:ext cx="10515600" cy="1325563"/>
+          </a:xfrm>
+          <a:prstGeom prst="rect">
+            <a:avLst/>
+          </a:prstGeom>
+        </p:spPr>
         <p:txBody>
           <a:bodyPr/>
           <a:lstStyle/>
@@ -1949,14 +2209,22 @@
             <p:ph type="dt" sz="half" idx="10"/>
           </p:nvPr>
         </p:nvSpPr>
-        <p:spPr/>
+        <p:spPr>
+          <a:xfrm>
+            <a:off x="838200" y="6356350"/>
+            <a:ext cx="2743200" cy="365125"/>
+          </a:xfrm>
+          <a:prstGeom prst="rect">
+            <a:avLst/>
+          </a:prstGeom>
+        </p:spPr>
         <p:txBody>
           <a:bodyPr/>
           <a:lstStyle/>
           <a:p>
             <a:fld id="{98ECE280-531B-476A-B9D6-EEB79A6A7E2D}" type="datetimeFigureOut">
               <a:rPr lang="pt-BR" smtClean="0"/>
-              <a:t>20/11/2023</a:t>
+              <a:t>21/11/2023</a:t>
             </a:fld>
             <a:endParaRPr lang="pt-BR"/>
           </a:p>
@@ -1978,7 +2246,15 @@
             <p:ph type="ftr" sz="quarter" idx="11"/>
           </p:nvPr>
         </p:nvSpPr>
-        <p:spPr/>
+        <p:spPr>
+          <a:xfrm>
+            <a:off x="4038600" y="6356350"/>
+            <a:ext cx="4114800" cy="365125"/>
+          </a:xfrm>
+          <a:prstGeom prst="rect">
+            <a:avLst/>
+          </a:prstGeom>
+        </p:spPr>
         <p:txBody>
           <a:bodyPr/>
           <a:lstStyle/>
@@ -2003,7 +2279,15 @@
             <p:ph type="sldNum" sz="quarter" idx="12"/>
           </p:nvPr>
         </p:nvSpPr>
-        <p:spPr/>
+        <p:spPr>
+          <a:xfrm>
+            <a:off x="8610600" y="6356350"/>
+            <a:ext cx="2743200" cy="365125"/>
+          </a:xfrm>
+          <a:prstGeom prst="rect">
+            <a:avLst/>
+          </a:prstGeom>
+        </p:spPr>
         <p:txBody>
           <a:bodyPr/>
           <a:lstStyle/>
@@ -2062,14 +2346,22 @@
             <p:ph type="dt" sz="half" idx="10"/>
           </p:nvPr>
         </p:nvSpPr>
-        <p:spPr/>
+        <p:spPr>
+          <a:xfrm>
+            <a:off x="838200" y="6356350"/>
+            <a:ext cx="2743200" cy="365125"/>
+          </a:xfrm>
+          <a:prstGeom prst="rect">
+            <a:avLst/>
+          </a:prstGeom>
+        </p:spPr>
         <p:txBody>
           <a:bodyPr/>
           <a:lstStyle/>
           <a:p>
             <a:fld id="{98ECE280-531B-476A-B9D6-EEB79A6A7E2D}" type="datetimeFigureOut">
               <a:rPr lang="pt-BR" smtClean="0"/>
-              <a:t>20/11/2023</a:t>
+              <a:t>21/11/2023</a:t>
             </a:fld>
             <a:endParaRPr lang="pt-BR"/>
           </a:p>
@@ -2091,7 +2383,15 @@
             <p:ph type="ftr" sz="quarter" idx="11"/>
           </p:nvPr>
         </p:nvSpPr>
-        <p:spPr/>
+        <p:spPr>
+          <a:xfrm>
+            <a:off x="4038600" y="6356350"/>
+            <a:ext cx="4114800" cy="365125"/>
+          </a:xfrm>
+          <a:prstGeom prst="rect">
+            <a:avLst/>
+          </a:prstGeom>
+        </p:spPr>
         <p:txBody>
           <a:bodyPr/>
           <a:lstStyle/>
@@ -2116,7 +2416,15 @@
             <p:ph type="sldNum" sz="quarter" idx="12"/>
           </p:nvPr>
         </p:nvSpPr>
-        <p:spPr/>
+        <p:spPr>
+          <a:xfrm>
+            <a:off x="8610600" y="6356350"/>
+            <a:ext cx="2743200" cy="365125"/>
+          </a:xfrm>
+          <a:prstGeom prst="rect">
+            <a:avLst/>
+          </a:prstGeom>
+        </p:spPr>
         <p:txBody>
           <a:bodyPr/>
           <a:lstStyle/>
@@ -2180,6 +2488,9 @@
             <a:off x="839788" y="457200"/>
             <a:ext cx="3932237" cy="1600200"/>
           </a:xfrm>
+          <a:prstGeom prst="rect">
+            <a:avLst/>
+          </a:prstGeom>
         </p:spPr>
         <p:txBody>
           <a:bodyPr anchor="b"/>
@@ -2217,6 +2528,9 @@
             <a:off x="5183188" y="987425"/>
             <a:ext cx="6172200" cy="4873625"/>
           </a:xfrm>
+          <a:prstGeom prst="rect">
+            <a:avLst/>
+          </a:prstGeom>
         </p:spPr>
         <p:txBody>
           <a:bodyPr/>
@@ -2307,6 +2621,9 @@
             <a:off x="839788" y="2057400"/>
             <a:ext cx="3932237" cy="3811588"/>
           </a:xfrm>
+          <a:prstGeom prst="rect">
+            <a:avLst/>
+          </a:prstGeom>
         </p:spPr>
         <p:txBody>
           <a:bodyPr/>
@@ -2373,14 +2690,22 @@
             <p:ph type="dt" sz="half" idx="10"/>
           </p:nvPr>
         </p:nvSpPr>
-        <p:spPr/>
+        <p:spPr>
+          <a:xfrm>
+            <a:off x="838200" y="6356350"/>
+            <a:ext cx="2743200" cy="365125"/>
+          </a:xfrm>
+          <a:prstGeom prst="rect">
+            <a:avLst/>
+          </a:prstGeom>
+        </p:spPr>
         <p:txBody>
           <a:bodyPr/>
           <a:lstStyle/>
           <a:p>
             <a:fld id="{98ECE280-531B-476A-B9D6-EEB79A6A7E2D}" type="datetimeFigureOut">
               <a:rPr lang="pt-BR" smtClean="0"/>
-              <a:t>20/11/2023</a:t>
+              <a:t>21/11/2023</a:t>
             </a:fld>
             <a:endParaRPr lang="pt-BR"/>
           </a:p>
@@ -2402,7 +2727,15 @@
             <p:ph type="ftr" sz="quarter" idx="11"/>
           </p:nvPr>
         </p:nvSpPr>
-        <p:spPr/>
+        <p:spPr>
+          <a:xfrm>
+            <a:off x="4038600" y="6356350"/>
+            <a:ext cx="4114800" cy="365125"/>
+          </a:xfrm>
+          <a:prstGeom prst="rect">
+            <a:avLst/>
+          </a:prstGeom>
+        </p:spPr>
         <p:txBody>
           <a:bodyPr/>
           <a:lstStyle/>
@@ -2427,7 +2760,15 @@
             <p:ph type="sldNum" sz="quarter" idx="12"/>
           </p:nvPr>
         </p:nvSpPr>
-        <p:spPr/>
+        <p:spPr>
+          <a:xfrm>
+            <a:off x="8610600" y="6356350"/>
+            <a:ext cx="2743200" cy="365125"/>
+          </a:xfrm>
+          <a:prstGeom prst="rect">
+            <a:avLst/>
+          </a:prstGeom>
+        </p:spPr>
         <p:txBody>
           <a:bodyPr/>
           <a:lstStyle/>
@@ -2491,6 +2832,9 @@
             <a:off x="839788" y="457200"/>
             <a:ext cx="3932237" cy="1600200"/>
           </a:xfrm>
+          <a:prstGeom prst="rect">
+            <a:avLst/>
+          </a:prstGeom>
         </p:spPr>
         <p:txBody>
           <a:bodyPr anchor="b"/>
@@ -2528,6 +2872,9 @@
             <a:off x="5183188" y="987425"/>
             <a:ext cx="6172200" cy="4873625"/>
           </a:xfrm>
+          <a:prstGeom prst="rect">
+            <a:avLst/>
+          </a:prstGeom>
         </p:spPr>
         <p:txBody>
           <a:bodyPr/>
@@ -2595,6 +2942,9 @@
             <a:off x="839788" y="2057400"/>
             <a:ext cx="3932237" cy="3811588"/>
           </a:xfrm>
+          <a:prstGeom prst="rect">
+            <a:avLst/>
+          </a:prstGeom>
         </p:spPr>
         <p:txBody>
           <a:bodyPr/>
@@ -2661,14 +3011,22 @@
             <p:ph type="dt" sz="half" idx="10"/>
           </p:nvPr>
         </p:nvSpPr>
-        <p:spPr/>
+        <p:spPr>
+          <a:xfrm>
+            <a:off x="838200" y="6356350"/>
+            <a:ext cx="2743200" cy="365125"/>
+          </a:xfrm>
+          <a:prstGeom prst="rect">
+            <a:avLst/>
+          </a:prstGeom>
+        </p:spPr>
         <p:txBody>
           <a:bodyPr/>
           <a:lstStyle/>
           <a:p>
             <a:fld id="{98ECE280-531B-476A-B9D6-EEB79A6A7E2D}" type="datetimeFigureOut">
               <a:rPr lang="pt-BR" smtClean="0"/>
-              <a:t>20/11/2023</a:t>
+              <a:t>21/11/2023</a:t>
             </a:fld>
             <a:endParaRPr lang="pt-BR"/>
           </a:p>
@@ -2690,7 +3048,15 @@
             <p:ph type="ftr" sz="quarter" idx="11"/>
           </p:nvPr>
         </p:nvSpPr>
-        <p:spPr/>
+        <p:spPr>
+          <a:xfrm>
+            <a:off x="4038600" y="6356350"/>
+            <a:ext cx="4114800" cy="365125"/>
+          </a:xfrm>
+          <a:prstGeom prst="rect">
+            <a:avLst/>
+          </a:prstGeom>
+        </p:spPr>
         <p:txBody>
           <a:bodyPr/>
           <a:lstStyle/>
@@ -2715,7 +3081,15 @@
             <p:ph type="sldNum" sz="quarter" idx="12"/>
           </p:nvPr>
         </p:nvSpPr>
-        <p:spPr/>
+        <p:spPr>
+          <a:xfrm>
+            <a:off x="8610600" y="6356350"/>
+            <a:ext cx="2743200" cy="365125"/>
+          </a:xfrm>
+          <a:prstGeom prst="rect">
+            <a:avLst/>
+          </a:prstGeom>
+        </p:spPr>
         <p:txBody>
           <a:bodyPr/>
           <a:lstStyle/>
@@ -2763,245 +3137,71 @@
           <a:chExt cx="0" cy="0"/>
         </a:xfrm>
       </p:grpSpPr>
-      <p:sp>
-        <p:nvSpPr>
-          <p:cNvPr id="2" name="Espaço Reservado para Título 1">
-            <a:extLst>
-              <a:ext uri="{FF2B5EF4-FFF2-40B4-BE49-F238E27FC236}">
-                <a16:creationId xmlns:a16="http://schemas.microsoft.com/office/drawing/2014/main" id="{594A0DE9-C68B-F0BC-E4D2-012247E962A8}"/>
-              </a:ext>
-            </a:extLst>
-          </p:cNvPr>
-          <p:cNvSpPr>
-            <a:spLocks noGrp="1"/>
-          </p:cNvSpPr>
-          <p:nvPr>
-            <p:ph type="title"/>
-          </p:nvPr>
-        </p:nvSpPr>
-        <p:spPr>
-          <a:xfrm>
-            <a:off x="838200" y="365125"/>
-            <a:ext cx="10515600" cy="1325563"/>
+      <p:pic>
+        <p:nvPicPr>
+          <p:cNvPr id="8" name="Imagem 7">
+            <a:extLst>
+              <a:ext uri="{FF2B5EF4-FFF2-40B4-BE49-F238E27FC236}">
+                <a16:creationId xmlns:a16="http://schemas.microsoft.com/office/drawing/2014/main" id="{B75B0133-74EC-DDFF-48A0-BB9DE4D3FE5F}"/>
+              </a:ext>
+            </a:extLst>
+          </p:cNvPr>
+          <p:cNvPicPr>
+            <a:picLocks noChangeAspect="1"/>
+          </p:cNvPicPr>
+          <p:nvPr userDrawn="1"/>
+        </p:nvPicPr>
+        <p:blipFill>
+          <a:blip r:embed="rId13"/>
+          <a:stretch>
+            <a:fillRect/>
+          </a:stretch>
+        </p:blipFill>
+        <p:spPr>
+          <a:xfrm>
+            <a:off x="10443541" y="240871"/>
+            <a:ext cx="1190791" cy="562053"/>
           </a:xfrm>
           <a:prstGeom prst="rect">
             <a:avLst/>
           </a:prstGeom>
         </p:spPr>
-        <p:txBody>
-          <a:bodyPr vert="horz" lIns="91440" tIns="45720" rIns="91440" bIns="45720" rtlCol="0" anchor="ctr">
-            <a:normAutofit/>
-          </a:bodyPr>
-          <a:lstStyle/>
-          <a:p>
-            <a:r>
-              <a:rPr lang="pt-BR"/>
-              <a:t>Clique para editar o título Mestre</a:t>
-            </a:r>
-          </a:p>
-        </p:txBody>
-      </p:sp>
-      <p:sp>
-        <p:nvSpPr>
-          <p:cNvPr id="3" name="Espaço Reservado para Texto 2">
-            <a:extLst>
-              <a:ext uri="{FF2B5EF4-FFF2-40B4-BE49-F238E27FC236}">
-                <a16:creationId xmlns:a16="http://schemas.microsoft.com/office/drawing/2014/main" id="{CB8BE59E-BA69-1F19-8B7D-537FAA7C475A}"/>
-              </a:ext>
-            </a:extLst>
-          </p:cNvPr>
-          <p:cNvSpPr>
-            <a:spLocks noGrp="1"/>
-          </p:cNvSpPr>
-          <p:nvPr>
-            <p:ph type="body" idx="1"/>
-          </p:nvPr>
-        </p:nvSpPr>
-        <p:spPr>
-          <a:xfrm>
-            <a:off x="838200" y="1825625"/>
-            <a:ext cx="10515600" cy="4351338"/>
+      </p:pic>
+      <p:sp>
+        <p:nvSpPr>
+          <p:cNvPr id="9" name="CaixaDeTexto 8">
+            <a:extLst>
+              <a:ext uri="{FF2B5EF4-FFF2-40B4-BE49-F238E27FC236}">
+                <a16:creationId xmlns:a16="http://schemas.microsoft.com/office/drawing/2014/main" id="{4E612A47-3A5D-9C65-4766-D9EFE57160BC}"/>
+              </a:ext>
+            </a:extLst>
+          </p:cNvPr>
+          <p:cNvSpPr txBox="1"/>
+          <p:nvPr userDrawn="1"/>
+        </p:nvSpPr>
+        <p:spPr>
+          <a:xfrm>
+            <a:off x="598818" y="233715"/>
+            <a:ext cx="6094562" cy="369332"/>
           </a:xfrm>
           <a:prstGeom prst="rect">
             <a:avLst/>
           </a:prstGeom>
-        </p:spPr>
-        <p:txBody>
-          <a:bodyPr vert="horz" lIns="91440" tIns="45720" rIns="91440" bIns="45720" rtlCol="0">
-            <a:normAutofit/>
+          <a:noFill/>
+        </p:spPr>
+        <p:txBody>
+          <a:bodyPr wrap="square">
+            <a:spAutoFit/>
           </a:bodyPr>
           <a:lstStyle/>
           <a:p>
-            <a:pPr lvl="0"/>
-            <a:r>
-              <a:rPr lang="pt-BR"/>
-              <a:t>Clique para editar os estilos de texto Mestres</a:t>
-            </a:r>
-          </a:p>
-          <a:p>
-            <a:pPr lvl="1"/>
-            <a:r>
-              <a:rPr lang="pt-BR"/>
-              <a:t>Segundo nível</a:t>
-            </a:r>
-          </a:p>
-          <a:p>
-            <a:pPr lvl="2"/>
-            <a:r>
-              <a:rPr lang="pt-BR"/>
-              <a:t>Terceiro nível</a:t>
-            </a:r>
-          </a:p>
-          <a:p>
-            <a:pPr lvl="3"/>
-            <a:r>
-              <a:rPr lang="pt-BR"/>
-              <a:t>Quarto nível</a:t>
-            </a:r>
-          </a:p>
-          <a:p>
-            <a:pPr lvl="4"/>
-            <a:r>
-              <a:rPr lang="pt-BR"/>
-              <a:t>Quinto nível</a:t>
-            </a:r>
-          </a:p>
-        </p:txBody>
-      </p:sp>
-      <p:sp>
-        <p:nvSpPr>
-          <p:cNvPr id="4" name="Espaço Reservado para Data 3">
-            <a:extLst>
-              <a:ext uri="{FF2B5EF4-FFF2-40B4-BE49-F238E27FC236}">
-                <a16:creationId xmlns:a16="http://schemas.microsoft.com/office/drawing/2014/main" id="{F42059DE-C321-B555-443D-459A43435AD3}"/>
-              </a:ext>
-            </a:extLst>
-          </p:cNvPr>
-          <p:cNvSpPr>
-            <a:spLocks noGrp="1"/>
-          </p:cNvSpPr>
-          <p:nvPr>
-            <p:ph type="dt" sz="half" idx="2"/>
-          </p:nvPr>
-        </p:nvSpPr>
-        <p:spPr>
-          <a:xfrm>
-            <a:off x="838200" y="6356350"/>
-            <a:ext cx="2743200" cy="365125"/>
-          </a:xfrm>
-          <a:prstGeom prst="rect">
-            <a:avLst/>
-          </a:prstGeom>
-        </p:spPr>
-        <p:txBody>
-          <a:bodyPr vert="horz" lIns="91440" tIns="45720" rIns="91440" bIns="45720" rtlCol="0" anchor="ctr"/>
-          <a:lstStyle>
-            <a:lvl1pPr algn="l">
-              <a:defRPr sz="1200">
-                <a:solidFill>
-                  <a:schemeClr val="tx1">
-                    <a:tint val="75000"/>
-                  </a:schemeClr>
-                </a:solidFill>
-              </a:defRPr>
-            </a:lvl1pPr>
-          </a:lstStyle>
-          <a:p>
-            <a:fld id="{98ECE280-531B-476A-B9D6-EEB79A6A7E2D}" type="datetimeFigureOut">
-              <a:rPr lang="pt-BR" smtClean="0"/>
-              <a:t>20/11/2023</a:t>
-            </a:fld>
-            <a:endParaRPr lang="pt-BR"/>
-          </a:p>
-        </p:txBody>
-      </p:sp>
-      <p:sp>
-        <p:nvSpPr>
-          <p:cNvPr id="5" name="Espaço Reservado para Rodapé 4">
-            <a:extLst>
-              <a:ext uri="{FF2B5EF4-FFF2-40B4-BE49-F238E27FC236}">
-                <a16:creationId xmlns:a16="http://schemas.microsoft.com/office/drawing/2014/main" id="{AC02E1AB-E5A5-CCBE-7458-A792122E8506}"/>
-              </a:ext>
-            </a:extLst>
-          </p:cNvPr>
-          <p:cNvSpPr>
-            <a:spLocks noGrp="1"/>
-          </p:cNvSpPr>
-          <p:nvPr>
-            <p:ph type="ftr" sz="quarter" idx="3"/>
-          </p:nvPr>
-        </p:nvSpPr>
-        <p:spPr>
-          <a:xfrm>
-            <a:off x="4038600" y="6356350"/>
-            <a:ext cx="4114800" cy="365125"/>
-          </a:xfrm>
-          <a:prstGeom prst="rect">
-            <a:avLst/>
-          </a:prstGeom>
-        </p:spPr>
-        <p:txBody>
-          <a:bodyPr vert="horz" lIns="91440" tIns="45720" rIns="91440" bIns="45720" rtlCol="0" anchor="ctr"/>
-          <a:lstStyle>
-            <a:lvl1pPr algn="ctr">
-              <a:defRPr sz="1200">
-                <a:solidFill>
-                  <a:schemeClr val="tx1">
-                    <a:tint val="75000"/>
-                  </a:schemeClr>
-                </a:solidFill>
-              </a:defRPr>
-            </a:lvl1pPr>
-          </a:lstStyle>
-          <a:p>
-            <a:endParaRPr lang="pt-BR"/>
-          </a:p>
-        </p:txBody>
-      </p:sp>
-      <p:sp>
-        <p:nvSpPr>
-          <p:cNvPr id="6" name="Espaço Reservado para Número de Slide 5">
-            <a:extLst>
-              <a:ext uri="{FF2B5EF4-FFF2-40B4-BE49-F238E27FC236}">
-                <a16:creationId xmlns:a16="http://schemas.microsoft.com/office/drawing/2014/main" id="{1B38461A-CFAA-D0B8-78E7-65ABB0C7F77A}"/>
-              </a:ext>
-            </a:extLst>
-          </p:cNvPr>
-          <p:cNvSpPr>
-            <a:spLocks noGrp="1"/>
-          </p:cNvSpPr>
-          <p:nvPr>
-            <p:ph type="sldNum" sz="quarter" idx="4"/>
-          </p:nvPr>
-        </p:nvSpPr>
-        <p:spPr>
-          <a:xfrm>
-            <a:off x="8610600" y="6356350"/>
-            <a:ext cx="2743200" cy="365125"/>
-          </a:xfrm>
-          <a:prstGeom prst="rect">
-            <a:avLst/>
-          </a:prstGeom>
-        </p:spPr>
-        <p:txBody>
-          <a:bodyPr vert="horz" lIns="91440" tIns="45720" rIns="91440" bIns="45720" rtlCol="0" anchor="ctr"/>
-          <a:lstStyle>
-            <a:lvl1pPr algn="r">
-              <a:defRPr sz="1200">
-                <a:solidFill>
-                  <a:schemeClr val="tx1">
-                    <a:tint val="75000"/>
-                  </a:schemeClr>
-                </a:solidFill>
-              </a:defRPr>
-            </a:lvl1pPr>
-          </a:lstStyle>
-          <a:p>
-            <a:fld id="{7B18BBDE-A27A-4AC5-96EF-A0DE941C750A}" type="slidenum">
-              <a:rPr lang="pt-BR" smtClean="0"/>
-              <a:t>‹nº›</a:t>
-            </a:fld>
-            <a:endParaRPr lang="pt-BR"/>
+            <a:r>
+              <a:rPr lang="pt-BR" b="1" dirty="0">
+                <a:latin typeface="Trebuchet MS" panose="020B0603020202020204" pitchFamily="34" charset="0"/>
+              </a:rPr>
+              <a:t>Projeto Final: Avaliação de Cafés</a:t>
+            </a:r>
+            <a:endParaRPr lang="pt-BR" b="1" dirty="0"/>
           </a:p>
         </p:txBody>
       </p:sp>
@@ -3344,20 +3544,90 @@
         </p:nvSpPr>
         <p:spPr>
           <a:xfrm>
-            <a:off x="1524000" y="1122363"/>
-            <a:ext cx="9144000" cy="1122073"/>
+            <a:off x="704491" y="1720461"/>
+            <a:ext cx="4997569" cy="3602038"/>
           </a:xfrm>
         </p:spPr>
         <p:txBody>
           <a:bodyPr/>
           <a:lstStyle/>
           <a:p>
-            <a:r>
+            <a:pPr algn="l">
+              <a:lnSpc>
+                <a:spcPct val="100000"/>
+              </a:lnSpc>
+              <a:spcBef>
+                <a:spcPts val="600"/>
+              </a:spcBef>
+              <a:spcAft>
+                <a:spcPts val="600"/>
+              </a:spcAft>
+            </a:pPr>
+            <a:r>
+              <a:rPr lang="pt-BR" sz="4800" dirty="0">
+                <a:latin typeface="Trebuchet MS" panose="020B0603020202020204" pitchFamily="34" charset="0"/>
+              </a:rPr>
+              <a:t>Projeto Final: Avaliação de Cafés</a:t>
+            </a:r>
+            <a:br>
+              <a:rPr lang="pt-BR" sz="4800" dirty="0">
+                <a:latin typeface="Trebuchet MS" panose="020B0603020202020204" pitchFamily="34" charset="0"/>
+              </a:rPr>
+            </a:br>
+            <a:br>
               <a:rPr lang="pt-BR" dirty="0">
                 <a:latin typeface="Trebuchet MS" panose="020B0603020202020204" pitchFamily="34" charset="0"/>
               </a:rPr>
-              <a:t>Avaliação de Cafés</a:t>
-            </a:r>
+            </a:br>
+            <a:r>
+              <a:rPr lang="pt-BR" sz="2400" dirty="0">
+                <a:latin typeface="Trebuchet MS" panose="020B0603020202020204" pitchFamily="34" charset="0"/>
+              </a:rPr>
+              <a:t>Flávio Barbosa </a:t>
+            </a:r>
+            <a:r>
+              <a:rPr lang="pt-BR" sz="2400" dirty="0" err="1">
+                <a:latin typeface="Trebuchet MS" panose="020B0603020202020204" pitchFamily="34" charset="0"/>
+              </a:rPr>
+              <a:t>Shirahige</a:t>
+            </a:r>
+            <a:br>
+              <a:rPr lang="pt-BR" sz="2400" dirty="0">
+                <a:latin typeface="Trebuchet MS" panose="020B0603020202020204" pitchFamily="34" charset="0"/>
+              </a:rPr>
+            </a:br>
+            <a:r>
+              <a:rPr lang="pt-BR" sz="2400" dirty="0">
+                <a:latin typeface="Trebuchet MS" panose="020B0603020202020204" pitchFamily="34" charset="0"/>
+              </a:rPr>
+              <a:t>Hélio Pereira de Oliveira</a:t>
+            </a:r>
+            <a:br>
+              <a:rPr lang="pt-BR" sz="2400" dirty="0">
+                <a:latin typeface="Trebuchet MS" panose="020B0603020202020204" pitchFamily="34" charset="0"/>
+              </a:rPr>
+            </a:br>
+            <a:r>
+              <a:rPr lang="pt-BR" sz="2400" dirty="0">
+                <a:latin typeface="Trebuchet MS" panose="020B0603020202020204" pitchFamily="34" charset="0"/>
+              </a:rPr>
+              <a:t>Michel Maurice </a:t>
+            </a:r>
+            <a:r>
+              <a:rPr lang="pt-BR" sz="2400" dirty="0" err="1">
+                <a:latin typeface="Trebuchet MS" panose="020B0603020202020204" pitchFamily="34" charset="0"/>
+              </a:rPr>
+              <a:t>Conjaud</a:t>
+            </a:r>
+            <a:r>
+              <a:rPr lang="pt-BR" sz="2400" dirty="0">
+                <a:latin typeface="Trebuchet MS" panose="020B0603020202020204" pitchFamily="34" charset="0"/>
+              </a:rPr>
+              <a:t> Neto</a:t>
+            </a:r>
+            <a:endParaRPr lang="pt-BR" dirty="0">
+              <a:latin typeface="Trebuchet MS" panose="020B0603020202020204" pitchFamily="34" charset="0"/>
+            </a:endParaRPr>
           </a:p>
         </p:txBody>
       </p:sp>
@@ -3383,7 +3653,7 @@
         </p:blipFill>
         <p:spPr>
           <a:xfrm>
-            <a:off x="3394471" y="2480107"/>
+            <a:off x="5904758" y="1306914"/>
             <a:ext cx="5403057" cy="3602038"/>
           </a:xfrm>
           <a:prstGeom prst="rect">
@@ -3391,6 +3661,99 @@
           </a:prstGeom>
         </p:spPr>
       </p:pic>
+      <p:sp>
+        <p:nvSpPr>
+          <p:cNvPr id="5" name="CaixaDeTexto 4">
+            <a:extLst>
+              <a:ext uri="{FF2B5EF4-FFF2-40B4-BE49-F238E27FC236}">
+                <a16:creationId xmlns:a16="http://schemas.microsoft.com/office/drawing/2014/main" id="{30B5050C-0F52-F0BD-F8FA-20EE172FEA03}"/>
+              </a:ext>
+            </a:extLst>
+          </p:cNvPr>
+          <p:cNvSpPr txBox="1"/>
+          <p:nvPr/>
+        </p:nvSpPr>
+        <p:spPr>
+          <a:xfrm>
+            <a:off x="3048719" y="6246326"/>
+            <a:ext cx="6094562" cy="369332"/>
+          </a:xfrm>
+          <a:prstGeom prst="rect">
+            <a:avLst/>
+          </a:prstGeom>
+          <a:noFill/>
+        </p:spPr>
+        <p:txBody>
+          <a:bodyPr wrap="square">
+            <a:spAutoFit/>
+          </a:bodyPr>
+          <a:lstStyle/>
+          <a:p>
+            <a:pPr algn="ctr"/>
+            <a:r>
+              <a:rPr lang="pt-BR" sz="1800" dirty="0">
+                <a:latin typeface="Trebuchet MS" panose="020B0603020202020204" pitchFamily="34" charset="0"/>
+              </a:rPr>
+              <a:t>Aprendizagem Estatística de Máquina II</a:t>
+            </a:r>
+            <a:endParaRPr lang="pt-BR" dirty="0"/>
+          </a:p>
+        </p:txBody>
+      </p:sp>
+      <p:sp>
+        <p:nvSpPr>
+          <p:cNvPr id="6" name="Retângulo 5">
+            <a:extLst>
+              <a:ext uri="{FF2B5EF4-FFF2-40B4-BE49-F238E27FC236}">
+                <a16:creationId xmlns:a16="http://schemas.microsoft.com/office/drawing/2014/main" id="{4561ACA5-D2DF-5F76-2E87-4E14CFBBA9C4}"/>
+              </a:ext>
+            </a:extLst>
+          </p:cNvPr>
+          <p:cNvSpPr/>
+          <p:nvPr/>
+        </p:nvSpPr>
+        <p:spPr>
+          <a:xfrm>
+            <a:off x="586596" y="241540"/>
+            <a:ext cx="3778370" cy="396815"/>
+          </a:xfrm>
+          <a:prstGeom prst="rect">
+            <a:avLst/>
+          </a:prstGeom>
+          <a:solidFill>
+            <a:schemeClr val="bg1"/>
+          </a:solidFill>
+          <a:ln>
+            <a:solidFill>
+              <a:schemeClr val="bg1"/>
+            </a:solidFill>
+          </a:ln>
+        </p:spPr>
+        <p:style>
+          <a:lnRef idx="2">
+            <a:schemeClr val="accent1">
+              <a:shade val="15000"/>
+            </a:schemeClr>
+          </a:lnRef>
+          <a:fillRef idx="1">
+            <a:schemeClr val="accent1"/>
+          </a:fillRef>
+          <a:effectRef idx="0">
+            <a:schemeClr val="accent1"/>
+          </a:effectRef>
+          <a:fontRef idx="minor">
+            <a:schemeClr val="lt1"/>
+          </a:fontRef>
+        </p:style>
+        <p:txBody>
+          <a:bodyPr rtlCol="0" anchor="ctr"/>
+          <a:lstStyle/>
+          <a:p>
+            <a:pPr algn="ctr"/>
+            <a:endParaRPr lang="pt-BR"/>
+          </a:p>
+        </p:txBody>
+      </p:sp>
     </p:spTree>
     <p:extLst>
       <p:ext uri="{BB962C8B-B14F-4D97-AF65-F5344CB8AC3E}">
@@ -3439,8 +3802,8 @@
         </p:nvSpPr>
         <p:spPr>
           <a:xfrm>
-            <a:off x="897147" y="957532"/>
-            <a:ext cx="10397706" cy="5184476"/>
+            <a:off x="897147" y="1026540"/>
+            <a:ext cx="10397706" cy="4330464"/>
           </a:xfrm>
         </p:spPr>
         <p:txBody>
@@ -3451,400 +3814,400 @@
           <a:p>
             <a:pPr algn="l"/>
             <a:r>
-              <a:rPr lang="pt-BR" sz="2400" b="1" dirty="0">
+              <a:rPr lang="pt-BR" sz="2000" b="1" dirty="0">
                 <a:latin typeface="Trebuchet MS" panose="020B0603020202020204" pitchFamily="34" charset="0"/>
               </a:rPr>
               <a:t>1. Objetivo</a:t>
             </a:r>
             <a:br>
-              <a:rPr lang="pt-BR" sz="2400" b="1" dirty="0">
+              <a:rPr lang="pt-BR" sz="2000" b="1" dirty="0">
                 <a:latin typeface="Trebuchet MS" panose="020B0603020202020204" pitchFamily="34" charset="0"/>
               </a:rPr>
             </a:br>
             <a:br>
-              <a:rPr lang="pt-BR" sz="2400" dirty="0">
+              <a:rPr lang="pt-BR" sz="2000" dirty="0">
                 <a:latin typeface="Trebuchet MS" panose="020B0603020202020204" pitchFamily="34" charset="0"/>
               </a:rPr>
             </a:br>
             <a:r>
-              <a:rPr lang="pt-BR" sz="2400" dirty="0">
+              <a:rPr lang="pt-BR" sz="2000" dirty="0">
                 <a:latin typeface="Trebuchet MS" panose="020B0603020202020204" pitchFamily="34" charset="0"/>
               </a:rPr>
               <a:t>O objetivo desse projeto é prever o pontuação/score da avaliação de cafés (</a:t>
             </a:r>
             <a:r>
-              <a:rPr lang="pt-BR" sz="2400" dirty="0" err="1">
+              <a:rPr lang="pt-BR" sz="2000" dirty="0" err="1">
                 <a:latin typeface="Trebuchet MS" panose="020B0603020202020204" pitchFamily="34" charset="0"/>
               </a:rPr>
               <a:t>total_cup_points</a:t>
             </a:r>
             <a:r>
-              <a:rPr lang="pt-BR" sz="2400" dirty="0">
+              <a:rPr lang="pt-BR" sz="2000" dirty="0">
                 <a:latin typeface="Trebuchet MS" panose="020B0603020202020204" pitchFamily="34" charset="0"/>
               </a:rPr>
               <a:t>) a partir das demais preditoras do </a:t>
             </a:r>
             <a:r>
-              <a:rPr lang="pt-BR" sz="2400" dirty="0" err="1">
+              <a:rPr lang="pt-BR" sz="2000" dirty="0" err="1">
                 <a:latin typeface="Trebuchet MS" panose="020B0603020202020204" pitchFamily="34" charset="0"/>
               </a:rPr>
               <a:t>dataset</a:t>
             </a:r>
             <a:r>
-              <a:rPr lang="pt-BR" sz="2400" dirty="0">
+              <a:rPr lang="pt-BR" sz="2000" dirty="0">
                 <a:latin typeface="Trebuchet MS" panose="020B0603020202020204" pitchFamily="34" charset="0"/>
               </a:rPr>
               <a:t> e agrupar os tipos de café (cluster) a partir da qualidade do café</a:t>
             </a:r>
             <a:br>
-              <a:rPr lang="pt-BR" sz="2400" dirty="0">
+              <a:rPr lang="pt-BR" sz="2000" dirty="0">
                 <a:latin typeface="Trebuchet MS" panose="020B0603020202020204" pitchFamily="34" charset="0"/>
               </a:rPr>
             </a:br>
             <a:br>
-              <a:rPr lang="pt-BR" sz="2400" dirty="0">
+              <a:rPr lang="pt-BR" sz="2000" dirty="0">
                 <a:latin typeface="Trebuchet MS" panose="020B0603020202020204" pitchFamily="34" charset="0"/>
               </a:rPr>
             </a:br>
             <a:r>
-              <a:rPr lang="pt-BR" sz="2400" b="1" dirty="0">
+              <a:rPr lang="pt-BR" sz="2000" b="1" dirty="0">
                 <a:latin typeface="Trebuchet MS" panose="020B0603020202020204" pitchFamily="34" charset="0"/>
               </a:rPr>
               <a:t>2. Dados</a:t>
             </a:r>
             <a:br>
-              <a:rPr lang="pt-BR" sz="2400" b="1" dirty="0">
+              <a:rPr lang="pt-BR" sz="2000" b="1" dirty="0">
                 <a:latin typeface="Trebuchet MS" panose="020B0603020202020204" pitchFamily="34" charset="0"/>
               </a:rPr>
             </a:br>
             <a:br>
-              <a:rPr lang="pt-BR" sz="2400" dirty="0">
+              <a:rPr lang="pt-BR" sz="2000" dirty="0">
                 <a:latin typeface="Trebuchet MS" panose="020B0603020202020204" pitchFamily="34" charset="0"/>
               </a:rPr>
             </a:br>
             <a:r>
-              <a:rPr lang="pt-BR" sz="2400" dirty="0">
+              <a:rPr lang="pt-BR" sz="2000" dirty="0">
                 <a:latin typeface="Trebuchet MS" panose="020B0603020202020204" pitchFamily="34" charset="0"/>
               </a:rPr>
               <a:t>Será utilizada a base de dados com informações de qualidade de café coletadas das avaliações do </a:t>
             </a:r>
             <a:r>
-              <a:rPr lang="en-US" sz="2400" dirty="0">
+              <a:rPr lang="en-US" sz="2000" dirty="0">
                 <a:latin typeface="Trebuchet MS" panose="020B0603020202020204" pitchFamily="34" charset="0"/>
               </a:rPr>
               <a:t>Coffee Quality Institute  de Janeiro de 2018. </a:t>
             </a:r>
             <a:br>
-              <a:rPr lang="en-US" sz="2400" dirty="0">
+              <a:rPr lang="en-US" sz="2000" dirty="0">
                 <a:latin typeface="Trebuchet MS" panose="020B0603020202020204" pitchFamily="34" charset="0"/>
               </a:rPr>
             </a:br>
             <a:r>
-              <a:rPr lang="en-US" sz="2400" dirty="0">
+              <a:rPr lang="en-US" sz="2000" dirty="0">
                 <a:latin typeface="Trebuchet MS" panose="020B0603020202020204" pitchFamily="34" charset="0"/>
               </a:rPr>
               <a:t>A </a:t>
             </a:r>
             <a:r>
-              <a:rPr lang="en-US" sz="2400" dirty="0" err="1">
+              <a:rPr lang="en-US" sz="2000" dirty="0" err="1">
                 <a:latin typeface="Trebuchet MS" panose="020B0603020202020204" pitchFamily="34" charset="0"/>
               </a:rPr>
               <a:t>avaliação</a:t>
             </a:r>
             <a:r>
-              <a:rPr lang="en-US" sz="2400" dirty="0">
+              <a:rPr lang="en-US" sz="2000" dirty="0">
                 <a:latin typeface="Trebuchet MS" panose="020B0603020202020204" pitchFamily="34" charset="0"/>
               </a:rPr>
               <a:t> dos café é </a:t>
             </a:r>
             <a:r>
-              <a:rPr lang="en-US" sz="2400" dirty="0" err="1">
+              <a:rPr lang="en-US" sz="2000" dirty="0" err="1">
                 <a:latin typeface="Trebuchet MS" panose="020B0603020202020204" pitchFamily="34" charset="0"/>
               </a:rPr>
               <a:t>feita</a:t>
             </a:r>
             <a:r>
-              <a:rPr lang="en-US" sz="2400" dirty="0">
+              <a:rPr lang="en-US" sz="2000" dirty="0">
                 <a:latin typeface="Trebuchet MS" panose="020B0603020202020204" pitchFamily="34" charset="0"/>
               </a:rPr>
               <a:t> a </a:t>
             </a:r>
             <a:r>
-              <a:rPr lang="en-US" sz="2400" dirty="0" err="1">
+              <a:rPr lang="en-US" sz="2000" dirty="0" err="1">
                 <a:latin typeface="Trebuchet MS" panose="020B0603020202020204" pitchFamily="34" charset="0"/>
               </a:rPr>
               <a:t>partir</a:t>
             </a:r>
             <a:r>
-              <a:rPr lang="en-US" sz="2400" dirty="0">
+              <a:rPr lang="en-US" sz="2000" dirty="0">
                 <a:latin typeface="Trebuchet MS" panose="020B0603020202020204" pitchFamily="34" charset="0"/>
               </a:rPr>
               <a:t> de </a:t>
             </a:r>
             <a:r>
-              <a:rPr lang="en-US" sz="2400" dirty="0" err="1">
+              <a:rPr lang="en-US" sz="2000" dirty="0" err="1">
                 <a:latin typeface="Trebuchet MS" panose="020B0603020202020204" pitchFamily="34" charset="0"/>
               </a:rPr>
               <a:t>diversas</a:t>
             </a:r>
             <a:r>
-              <a:rPr lang="en-US" sz="2400" dirty="0">
+              <a:rPr lang="en-US" sz="2000" dirty="0">
                 <a:latin typeface="Trebuchet MS" panose="020B0603020202020204" pitchFamily="34" charset="0"/>
               </a:rPr>
               <a:t> </a:t>
             </a:r>
             <a:r>
-              <a:rPr lang="en-US" sz="2400" dirty="0" err="1">
+              <a:rPr lang="en-US" sz="2000" dirty="0" err="1">
                 <a:latin typeface="Trebuchet MS" panose="020B0603020202020204" pitchFamily="34" charset="0"/>
               </a:rPr>
               <a:t>características</a:t>
             </a:r>
             <a:r>
-              <a:rPr lang="en-US" sz="2400" dirty="0">
+              <a:rPr lang="en-US" sz="2000" dirty="0">
                 <a:latin typeface="Trebuchet MS" panose="020B0603020202020204" pitchFamily="34" charset="0"/>
               </a:rPr>
               <a:t> do café, </a:t>
             </a:r>
             <a:r>
-              <a:rPr lang="en-US" sz="2400" dirty="0" err="1">
+              <a:rPr lang="en-US" sz="2000" dirty="0" err="1">
                 <a:latin typeface="Trebuchet MS" panose="020B0603020202020204" pitchFamily="34" charset="0"/>
               </a:rPr>
               <a:t>como</a:t>
             </a:r>
             <a:r>
-              <a:rPr lang="en-US" sz="2400" dirty="0">
+              <a:rPr lang="en-US" sz="2000" dirty="0">
                 <a:latin typeface="Trebuchet MS" panose="020B0603020202020204" pitchFamily="34" charset="0"/>
               </a:rPr>
               <a:t> </a:t>
             </a:r>
             <a:r>
-              <a:rPr lang="en-US" sz="2400" dirty="0" err="1">
+              <a:rPr lang="en-US" sz="2000" dirty="0" err="1">
                 <a:latin typeface="Trebuchet MS" panose="020B0603020202020204" pitchFamily="34" charset="0"/>
               </a:rPr>
               <a:t>acidez</a:t>
             </a:r>
             <a:r>
-              <a:rPr lang="en-US" sz="2400" dirty="0">
+              <a:rPr lang="en-US" sz="2000" dirty="0">
                 <a:latin typeface="Trebuchet MS" panose="020B0603020202020204" pitchFamily="34" charset="0"/>
               </a:rPr>
               <a:t>, </a:t>
             </a:r>
             <a:r>
-              <a:rPr lang="en-US" sz="2400" dirty="0" err="1">
+              <a:rPr lang="en-US" sz="2000" dirty="0" err="1">
                 <a:latin typeface="Trebuchet MS" panose="020B0603020202020204" pitchFamily="34" charset="0"/>
               </a:rPr>
               <a:t>doçura</a:t>
             </a:r>
             <a:r>
-              <a:rPr lang="en-US" sz="2400" dirty="0">
+              <a:rPr lang="en-US" sz="2000" dirty="0">
                 <a:latin typeface="Trebuchet MS" panose="020B0603020202020204" pitchFamily="34" charset="0"/>
               </a:rPr>
               <a:t>, </a:t>
             </a:r>
             <a:r>
-              <a:rPr lang="en-US" sz="2400" dirty="0" err="1">
+              <a:rPr lang="en-US" sz="2000" dirty="0" err="1">
                 <a:latin typeface="Trebuchet MS" panose="020B0603020202020204" pitchFamily="34" charset="0"/>
               </a:rPr>
               <a:t>equilíbrio</a:t>
             </a:r>
             <a:r>
-              <a:rPr lang="en-US" sz="2400" dirty="0">
+              <a:rPr lang="en-US" sz="2000" dirty="0">
                 <a:latin typeface="Trebuchet MS" panose="020B0603020202020204" pitchFamily="34" charset="0"/>
               </a:rPr>
               <a:t> etc. e é </a:t>
             </a:r>
             <a:r>
-              <a:rPr lang="en-US" sz="2400" dirty="0" err="1">
+              <a:rPr lang="en-US" sz="2000" dirty="0" err="1">
                 <a:latin typeface="Trebuchet MS" panose="020B0603020202020204" pitchFamily="34" charset="0"/>
               </a:rPr>
               <a:t>pontuada</a:t>
             </a:r>
             <a:r>
-              <a:rPr lang="en-US" sz="2400" dirty="0">
+              <a:rPr lang="en-US" sz="2000" dirty="0">
                 <a:latin typeface="Trebuchet MS" panose="020B0603020202020204" pitchFamily="34" charset="0"/>
               </a:rPr>
               <a:t> </a:t>
             </a:r>
             <a:r>
-              <a:rPr lang="en-US" sz="2400" dirty="0" err="1">
+              <a:rPr lang="en-US" sz="2000" dirty="0" err="1">
                 <a:latin typeface="Trebuchet MS" panose="020B0603020202020204" pitchFamily="34" charset="0"/>
               </a:rPr>
               <a:t>numa</a:t>
             </a:r>
             <a:r>
-              <a:rPr lang="en-US" sz="2400" dirty="0">
+              <a:rPr lang="en-US" sz="2000" dirty="0">
                 <a:latin typeface="Trebuchet MS" panose="020B0603020202020204" pitchFamily="34" charset="0"/>
               </a:rPr>
               <a:t> </a:t>
             </a:r>
             <a:r>
-              <a:rPr lang="en-US" sz="2400" dirty="0" err="1">
+              <a:rPr lang="en-US" sz="2000" dirty="0" err="1">
                 <a:latin typeface="Trebuchet MS" panose="020B0603020202020204" pitchFamily="34" charset="0"/>
               </a:rPr>
               <a:t>escala</a:t>
             </a:r>
             <a:r>
-              <a:rPr lang="en-US" sz="2400" dirty="0">
+              <a:rPr lang="en-US" sz="2000" dirty="0">
                 <a:latin typeface="Trebuchet MS" panose="020B0603020202020204" pitchFamily="34" charset="0"/>
               </a:rPr>
               <a:t> de 0 a 100. Essa </a:t>
             </a:r>
             <a:r>
-              <a:rPr lang="en-US" sz="2400" dirty="0" err="1">
+              <a:rPr lang="en-US" sz="2000" dirty="0" err="1">
                 <a:latin typeface="Trebuchet MS" panose="020B0603020202020204" pitchFamily="34" charset="0"/>
               </a:rPr>
               <a:t>pontuação</a:t>
             </a:r>
             <a:r>
-              <a:rPr lang="en-US" sz="2400" dirty="0">
+              <a:rPr lang="en-US" sz="2000" dirty="0">
                 <a:latin typeface="Trebuchet MS" panose="020B0603020202020204" pitchFamily="34" charset="0"/>
               </a:rPr>
               <a:t>/score </a:t>
             </a:r>
             <a:r>
-              <a:rPr lang="en-US" sz="2400" dirty="0" err="1">
+              <a:rPr lang="en-US" sz="2000" dirty="0" err="1">
                 <a:latin typeface="Trebuchet MS" panose="020B0603020202020204" pitchFamily="34" charset="0"/>
               </a:rPr>
               <a:t>será</a:t>
             </a:r>
             <a:r>
-              <a:rPr lang="en-US" sz="2400" dirty="0">
+              <a:rPr lang="en-US" sz="2000" dirty="0">
                 <a:latin typeface="Trebuchet MS" panose="020B0603020202020204" pitchFamily="34" charset="0"/>
               </a:rPr>
               <a:t> a </a:t>
             </a:r>
             <a:r>
-              <a:rPr lang="en-US" sz="2400" dirty="0" err="1">
+              <a:rPr lang="en-US" sz="2000" dirty="0" err="1">
                 <a:latin typeface="Trebuchet MS" panose="020B0603020202020204" pitchFamily="34" charset="0"/>
               </a:rPr>
               <a:t>variável</a:t>
             </a:r>
             <a:r>
-              <a:rPr lang="en-US" sz="2400" dirty="0">
+              <a:rPr lang="en-US" sz="2000" dirty="0">
                 <a:latin typeface="Trebuchet MS" panose="020B0603020202020204" pitchFamily="34" charset="0"/>
               </a:rPr>
               <a:t> </a:t>
             </a:r>
             <a:r>
-              <a:rPr lang="en-US" sz="2400" dirty="0" err="1">
+              <a:rPr lang="en-US" sz="2000" dirty="0" err="1">
                 <a:latin typeface="Trebuchet MS" panose="020B0603020202020204" pitchFamily="34" charset="0"/>
               </a:rPr>
               <a:t>resposta</a:t>
             </a:r>
             <a:r>
-              <a:rPr lang="en-US" sz="2400" dirty="0">
+              <a:rPr lang="en-US" sz="2000" dirty="0">
                 <a:latin typeface="Trebuchet MS" panose="020B0603020202020204" pitchFamily="34" charset="0"/>
               </a:rPr>
               <a:t> dos </a:t>
             </a:r>
             <a:r>
-              <a:rPr lang="en-US" sz="2400" dirty="0" err="1">
+              <a:rPr lang="en-US" sz="2000" dirty="0" err="1">
                 <a:latin typeface="Trebuchet MS" panose="020B0603020202020204" pitchFamily="34" charset="0"/>
               </a:rPr>
               <a:t>modelos</a:t>
             </a:r>
             <a:r>
-              <a:rPr lang="en-US" sz="2400" dirty="0">
+              <a:rPr lang="en-US" sz="2000" dirty="0">
                 <a:latin typeface="Trebuchet MS" panose="020B0603020202020204" pitchFamily="34" charset="0"/>
               </a:rPr>
               <a:t> </a:t>
             </a:r>
             <a:r>
-              <a:rPr lang="en-US" sz="2400" dirty="0" err="1">
+              <a:rPr lang="en-US" sz="2000" dirty="0" err="1">
                 <a:latin typeface="Trebuchet MS" panose="020B0603020202020204" pitchFamily="34" charset="0"/>
               </a:rPr>
               <a:t>supervisionados</a:t>
             </a:r>
             <a:r>
-              <a:rPr lang="en-US" sz="2400" dirty="0">
+              <a:rPr lang="en-US" sz="2000" dirty="0">
                 <a:latin typeface="Trebuchet MS" panose="020B0603020202020204" pitchFamily="34" charset="0"/>
               </a:rPr>
               <a:t>.</a:t>
             </a:r>
             <a:br>
-              <a:rPr lang="en-US" sz="2400" dirty="0">
+              <a:rPr lang="en-US" sz="2000" dirty="0">
                 <a:latin typeface="Trebuchet MS" panose="020B0603020202020204" pitchFamily="34" charset="0"/>
               </a:rPr>
             </a:br>
             <a:r>
-              <a:rPr lang="en-US" sz="2400" dirty="0">
+              <a:rPr lang="en-US" sz="2000" dirty="0">
                 <a:latin typeface="Trebuchet MS" panose="020B0603020202020204" pitchFamily="34" charset="0"/>
               </a:rPr>
               <a:t>Essa base de dados </a:t>
             </a:r>
             <a:r>
-              <a:rPr lang="en-US" sz="2400" dirty="0" err="1">
+              <a:rPr lang="en-US" sz="2000" dirty="0" err="1">
                 <a:latin typeface="Trebuchet MS" panose="020B0603020202020204" pitchFamily="34" charset="0"/>
               </a:rPr>
               <a:t>possuim</a:t>
             </a:r>
             <a:r>
-              <a:rPr lang="en-US" sz="2400" dirty="0">
+              <a:rPr lang="en-US" sz="2000" dirty="0">
                 <a:latin typeface="Trebuchet MS" panose="020B0603020202020204" pitchFamily="34" charset="0"/>
               </a:rPr>
               <a:t> 1339 </a:t>
             </a:r>
             <a:r>
-              <a:rPr lang="en-US" sz="2400" dirty="0" err="1">
+              <a:rPr lang="en-US" sz="2000" dirty="0" err="1">
                 <a:latin typeface="Trebuchet MS" panose="020B0603020202020204" pitchFamily="34" charset="0"/>
               </a:rPr>
               <a:t>observações</a:t>
             </a:r>
             <a:r>
-              <a:rPr lang="en-US" sz="2400" dirty="0">
+              <a:rPr lang="en-US" sz="2000" dirty="0">
                 <a:latin typeface="Trebuchet MS" panose="020B0603020202020204" pitchFamily="34" charset="0"/>
               </a:rPr>
               <a:t> e 43 </a:t>
             </a:r>
             <a:r>
-              <a:rPr lang="en-US" sz="2400" dirty="0" err="1">
+              <a:rPr lang="en-US" sz="2000" dirty="0" err="1">
                 <a:latin typeface="Trebuchet MS" panose="020B0603020202020204" pitchFamily="34" charset="0"/>
               </a:rPr>
               <a:t>variáveis</a:t>
             </a:r>
             <a:r>
-              <a:rPr lang="en-US" sz="2400" dirty="0">
+              <a:rPr lang="en-US" sz="2000" dirty="0">
                 <a:latin typeface="Trebuchet MS" panose="020B0603020202020204" pitchFamily="34" charset="0"/>
               </a:rPr>
               <a:t>, </a:t>
             </a:r>
             <a:r>
-              <a:rPr lang="en-US" sz="2400" dirty="0" err="1">
+              <a:rPr lang="en-US" sz="2000" dirty="0" err="1">
                 <a:latin typeface="Trebuchet MS" panose="020B0603020202020204" pitchFamily="34" charset="0"/>
               </a:rPr>
               <a:t>incluindo</a:t>
             </a:r>
             <a:r>
-              <a:rPr lang="en-US" sz="2400" dirty="0">
+              <a:rPr lang="en-US" sz="2000" dirty="0">
                 <a:latin typeface="Trebuchet MS" panose="020B0603020202020204" pitchFamily="34" charset="0"/>
               </a:rPr>
               <a:t> a </a:t>
             </a:r>
             <a:r>
-              <a:rPr lang="en-US" sz="2400" dirty="0" err="1">
+              <a:rPr lang="en-US" sz="2000" dirty="0" err="1">
                 <a:latin typeface="Trebuchet MS" panose="020B0603020202020204" pitchFamily="34" charset="0"/>
               </a:rPr>
               <a:t>variável</a:t>
             </a:r>
             <a:r>
-              <a:rPr lang="en-US" sz="2400" dirty="0">
+              <a:rPr lang="en-US" sz="2000" dirty="0">
                 <a:latin typeface="Trebuchet MS" panose="020B0603020202020204" pitchFamily="34" charset="0"/>
               </a:rPr>
               <a:t> </a:t>
             </a:r>
             <a:r>
-              <a:rPr lang="en-US" sz="2400" dirty="0" err="1">
+              <a:rPr lang="en-US" sz="2000" dirty="0" err="1">
                 <a:latin typeface="Trebuchet MS" panose="020B0603020202020204" pitchFamily="34" charset="0"/>
               </a:rPr>
               <a:t>resposta</a:t>
             </a:r>
             <a:r>
-              <a:rPr lang="en-US" sz="2400" dirty="0">
+              <a:rPr lang="en-US" sz="2000" dirty="0">
                 <a:latin typeface="Trebuchet MS" panose="020B0603020202020204" pitchFamily="34" charset="0"/>
               </a:rPr>
               <a:t>.</a:t>
             </a:r>
-            <a:endParaRPr lang="pt-BR" sz="2400" dirty="0">
+            <a:endParaRPr lang="pt-BR" sz="2000" dirty="0">
               <a:latin typeface="Trebuchet MS" panose="020B0603020202020204" pitchFamily="34" charset="0"/>
             </a:endParaRPr>
           </a:p>
@@ -3898,8 +4261,8 @@
         </p:nvSpPr>
         <p:spPr>
           <a:xfrm>
-            <a:off x="897147" y="862643"/>
-            <a:ext cx="10397706" cy="4425350"/>
+            <a:off x="897147" y="957529"/>
+            <a:ext cx="10397706" cy="5003324"/>
           </a:xfrm>
         </p:spPr>
         <p:txBody>
@@ -3908,144 +4271,206 @@
           </a:bodyPr>
           <a:lstStyle/>
           <a:p>
-            <a:pPr algn="l"/>
-            <a:r>
-              <a:rPr lang="pt-BR" sz="2400" b="1" dirty="0">
+            <a:pPr algn="l">
+              <a:spcBef>
+                <a:spcPts val="600"/>
+              </a:spcBef>
+              <a:spcAft>
+                <a:spcPts val="600"/>
+              </a:spcAft>
+            </a:pPr>
+            <a:r>
+              <a:rPr lang="pt-BR" sz="2000" b="1" dirty="0">
                 <a:latin typeface="Trebuchet MS" panose="020B0603020202020204" pitchFamily="34" charset="0"/>
               </a:rPr>
               <a:t>3. Modelagem </a:t>
             </a:r>
             <a:br>
-              <a:rPr lang="pt-BR" sz="2400" b="1" dirty="0">
+              <a:rPr lang="pt-BR" sz="2000" b="1" dirty="0">
                 <a:latin typeface="Trebuchet MS" panose="020B0603020202020204" pitchFamily="34" charset="0"/>
               </a:rPr>
             </a:br>
             <a:br>
-              <a:rPr lang="pt-BR" sz="2400" dirty="0">
+              <a:rPr lang="pt-BR" sz="2000" dirty="0">
                 <a:latin typeface="Trebuchet MS" panose="020B0603020202020204" pitchFamily="34" charset="0"/>
               </a:rPr>
             </a:br>
             <a:r>
-              <a:rPr lang="pt-BR" sz="2400" dirty="0">
+              <a:rPr lang="pt-BR" sz="2000" dirty="0">
                 <a:latin typeface="Trebuchet MS" panose="020B0603020202020204" pitchFamily="34" charset="0"/>
               </a:rPr>
               <a:t>Serão aplicadas duas abordagem: </a:t>
             </a:r>
             <a:r>
-              <a:rPr lang="pt-BR" sz="2400" dirty="0" err="1">
+              <a:rPr lang="pt-BR" sz="2000" dirty="0" err="1">
                 <a:latin typeface="Trebuchet MS" panose="020B0603020202020204" pitchFamily="34" charset="0"/>
               </a:rPr>
               <a:t>supervionada</a:t>
             </a:r>
             <a:r>
-              <a:rPr lang="pt-BR" sz="2400" dirty="0">
+              <a:rPr lang="pt-BR" sz="2000" dirty="0">
                 <a:latin typeface="Trebuchet MS" panose="020B0603020202020204" pitchFamily="34" charset="0"/>
               </a:rPr>
               <a:t> e não supervisionada.</a:t>
             </a:r>
             <a:br>
-              <a:rPr lang="pt-BR" sz="2400" dirty="0">
+              <a:rPr lang="pt-BR" sz="2000" dirty="0">
                 <a:latin typeface="Trebuchet MS" panose="020B0603020202020204" pitchFamily="34" charset="0"/>
               </a:rPr>
             </a:br>
             <a:br>
-              <a:rPr lang="pt-BR" sz="2400" dirty="0">
+              <a:rPr lang="pt-BR" sz="2000" dirty="0">
                 <a:latin typeface="Trebuchet MS" panose="020B0603020202020204" pitchFamily="34" charset="0"/>
               </a:rPr>
             </a:br>
             <a:r>
-              <a:rPr lang="pt-BR" sz="2400" dirty="0">
-                <a:latin typeface="Trebuchet MS" panose="020B0603020202020204" pitchFamily="34" charset="0"/>
-              </a:rPr>
-              <a:t>O objetivo da análise supervisionada é prever qual será o rating do café a partir da qualidade do café. Serão aplicados os modelos de regressão linear, </a:t>
-            </a:r>
-            <a:r>
-              <a:rPr lang="pt-BR" sz="2400" dirty="0" err="1">
+              <a:rPr lang="pt-BR" sz="2000" dirty="0">
+                <a:latin typeface="Trebuchet MS" panose="020B0603020202020204" pitchFamily="34" charset="0"/>
+              </a:rPr>
+              <a:t>O objetivo da análise supervisionada é prever qual será o rating do café a partir da qualidade do café. Serão aplicados os seguintes modelos:</a:t>
+            </a:r>
+            <a:br>
+              <a:rPr lang="pt-BR" sz="2000" dirty="0">
+                <a:latin typeface="Trebuchet MS" panose="020B0603020202020204" pitchFamily="34" charset="0"/>
+              </a:rPr>
+            </a:br>
+            <a:r>
+              <a:rPr lang="pt-BR" sz="2000" b="1" dirty="0">
+                <a:latin typeface="Trebuchet MS" panose="020B0603020202020204" pitchFamily="34" charset="0"/>
+              </a:rPr>
+              <a:t>	- Regressão linear</a:t>
+            </a:r>
+            <a:br>
+              <a:rPr lang="pt-BR" sz="2000" b="1" dirty="0">
+                <a:latin typeface="Trebuchet MS" panose="020B0603020202020204" pitchFamily="34" charset="0"/>
+              </a:rPr>
+            </a:br>
+            <a:r>
+              <a:rPr lang="pt-BR" sz="2000" b="1" dirty="0">
+                <a:latin typeface="Trebuchet MS" panose="020B0603020202020204" pitchFamily="34" charset="0"/>
+              </a:rPr>
+              <a:t>	- </a:t>
+            </a:r>
+            <a:r>
+              <a:rPr lang="pt-BR" sz="2000" b="1" dirty="0" err="1">
                 <a:latin typeface="Trebuchet MS" panose="020B0603020202020204" pitchFamily="34" charset="0"/>
               </a:rPr>
               <a:t>Xgboosting</a:t>
             </a:r>
-            <a:r>
-              <a:rPr lang="pt-BR" sz="2400" dirty="0">
-                <a:latin typeface="Trebuchet MS" panose="020B0603020202020204" pitchFamily="34" charset="0"/>
-              </a:rPr>
-              <a:t> e Redes Neurais. Para tal, serão excluídas as colunas categóricas (exceto </a:t>
-            </a:r>
-            <a:r>
-              <a:rPr lang="pt-BR" sz="2400" dirty="0" err="1">
-                <a:latin typeface="Trebuchet MS" panose="020B0603020202020204" pitchFamily="34" charset="0"/>
-              </a:rPr>
-              <a:t>species</a:t>
-            </a:r>
-            <a:r>
-              <a:rPr lang="pt-BR" sz="2400" dirty="0">
-                <a:latin typeface="Trebuchet MS" panose="020B0603020202020204" pitchFamily="34" charset="0"/>
-              </a:rPr>
-              <a:t>, </a:t>
-            </a:r>
-            <a:r>
-              <a:rPr lang="pt-BR" sz="2400" dirty="0" err="1">
-                <a:latin typeface="Trebuchet MS" panose="020B0603020202020204" pitchFamily="34" charset="0"/>
-              </a:rPr>
-              <a:t>country_of_origin</a:t>
-            </a:r>
-            <a:r>
-              <a:rPr lang="pt-BR" sz="2400" dirty="0">
-                <a:latin typeface="Trebuchet MS" panose="020B0603020202020204" pitchFamily="34" charset="0"/>
-              </a:rPr>
-              <a:t>, </a:t>
-            </a:r>
-            <a:r>
-              <a:rPr lang="pt-BR" sz="2400" dirty="0" err="1">
-                <a:latin typeface="Trebuchet MS" panose="020B0603020202020204" pitchFamily="34" charset="0"/>
-              </a:rPr>
-              <a:t>processing_method</a:t>
-            </a:r>
-            <a:r>
-              <a:rPr lang="pt-BR" sz="2400" dirty="0">
-                <a:latin typeface="Trebuchet MS" panose="020B0603020202020204" pitchFamily="34" charset="0"/>
-              </a:rPr>
-              <a:t>, color e </a:t>
-            </a:r>
-            <a:r>
-              <a:rPr lang="pt-BR" sz="2400" dirty="0" err="1">
-                <a:latin typeface="Trebuchet MS" panose="020B0603020202020204" pitchFamily="34" charset="0"/>
-              </a:rPr>
-              <a:t>unit_of_measurement</a:t>
-            </a:r>
-            <a:r>
-              <a:rPr lang="pt-BR" sz="2400" dirty="0">
-                <a:latin typeface="Trebuchet MS" panose="020B0603020202020204" pitchFamily="34" charset="0"/>
-              </a:rPr>
-              <a:t>)</a:t>
-            </a:r>
             <a:br>
-              <a:rPr lang="pt-BR" sz="2400" dirty="0">
+              <a:rPr lang="pt-BR" sz="2000" b="1" dirty="0">
+                <a:latin typeface="Trebuchet MS" panose="020B0603020202020204" pitchFamily="34" charset="0"/>
+              </a:rPr>
+            </a:br>
+            <a:r>
+              <a:rPr lang="pt-BR" sz="2000" b="1" dirty="0">
+                <a:latin typeface="Trebuchet MS" panose="020B0603020202020204" pitchFamily="34" charset="0"/>
+              </a:rPr>
+              <a:t>	- Redes Neurais</a:t>
+            </a:r>
+            <a:br>
+              <a:rPr lang="pt-BR" sz="2000" dirty="0">
                 <a:latin typeface="Trebuchet MS" panose="020B0603020202020204" pitchFamily="34" charset="0"/>
               </a:rPr>
             </a:br>
             <a:br>
-              <a:rPr lang="pt-BR" sz="2400" dirty="0">
+              <a:rPr lang="pt-BR" sz="2000" dirty="0">
                 <a:latin typeface="Trebuchet MS" panose="020B0603020202020204" pitchFamily="34" charset="0"/>
               </a:rPr>
             </a:br>
             <a:r>
-              <a:rPr lang="pt-BR" sz="2400" dirty="0">
-                <a:latin typeface="Trebuchet MS" panose="020B0603020202020204" pitchFamily="34" charset="0"/>
-              </a:rPr>
-              <a:t>Na análise não supervisionada serão agrupados os cafés em grupo de qualidade similar a partir dos modelos de K-</a:t>
-            </a:r>
-            <a:r>
-              <a:rPr lang="pt-BR" sz="2400" dirty="0" err="1">
+              <a:rPr lang="pt-BR" sz="2000" dirty="0">
+                <a:latin typeface="Trebuchet MS" panose="020B0603020202020204" pitchFamily="34" charset="0"/>
+              </a:rPr>
+              <a:t>Para tal, serão excluídas as colunas categóricas (exceto </a:t>
+            </a:r>
+            <a:r>
+              <a:rPr lang="pt-BR" sz="2000" dirty="0" err="1">
+                <a:latin typeface="Trebuchet MS" panose="020B0603020202020204" pitchFamily="34" charset="0"/>
+              </a:rPr>
+              <a:t>species</a:t>
+            </a:r>
+            <a:r>
+              <a:rPr lang="pt-BR" sz="2000" dirty="0">
+                <a:latin typeface="Trebuchet MS" panose="020B0603020202020204" pitchFamily="34" charset="0"/>
+              </a:rPr>
+              <a:t>, </a:t>
+            </a:r>
+            <a:r>
+              <a:rPr lang="pt-BR" sz="2000" dirty="0" err="1">
+                <a:latin typeface="Trebuchet MS" panose="020B0603020202020204" pitchFamily="34" charset="0"/>
+              </a:rPr>
+              <a:t>country_of_origin</a:t>
+            </a:r>
+            <a:r>
+              <a:rPr lang="pt-BR" sz="2000" dirty="0">
+                <a:latin typeface="Trebuchet MS" panose="020B0603020202020204" pitchFamily="34" charset="0"/>
+              </a:rPr>
+              <a:t>, </a:t>
+            </a:r>
+            <a:r>
+              <a:rPr lang="pt-BR" sz="2000" dirty="0" err="1">
+                <a:latin typeface="Trebuchet MS" panose="020B0603020202020204" pitchFamily="34" charset="0"/>
+              </a:rPr>
+              <a:t>processing_method</a:t>
+            </a:r>
+            <a:r>
+              <a:rPr lang="pt-BR" sz="2000" dirty="0">
+                <a:latin typeface="Trebuchet MS" panose="020B0603020202020204" pitchFamily="34" charset="0"/>
+              </a:rPr>
+              <a:t>, color e </a:t>
+            </a:r>
+            <a:r>
+              <a:rPr lang="pt-BR" sz="2000" dirty="0" err="1">
+                <a:latin typeface="Trebuchet MS" panose="020B0603020202020204" pitchFamily="34" charset="0"/>
+              </a:rPr>
+              <a:t>unit_of_measurement</a:t>
+            </a:r>
+            <a:r>
+              <a:rPr lang="pt-BR" sz="2000" dirty="0">
+                <a:latin typeface="Trebuchet MS" panose="020B0603020202020204" pitchFamily="34" charset="0"/>
+              </a:rPr>
+              <a:t>)</a:t>
+            </a:r>
+            <a:br>
+              <a:rPr lang="pt-BR" sz="2000" dirty="0">
+                <a:latin typeface="Trebuchet MS" panose="020B0603020202020204" pitchFamily="34" charset="0"/>
+              </a:rPr>
+            </a:br>
+            <a:br>
+              <a:rPr lang="pt-BR" sz="2000" dirty="0">
+                <a:latin typeface="Trebuchet MS" panose="020B0603020202020204" pitchFamily="34" charset="0"/>
+              </a:rPr>
+            </a:br>
+            <a:r>
+              <a:rPr lang="pt-BR" sz="2000" dirty="0">
+                <a:latin typeface="Trebuchet MS" panose="020B0603020202020204" pitchFamily="34" charset="0"/>
+              </a:rPr>
+              <a:t>Na análise não supervisionada serão agrupados os cafés em grupo de qualidade similar a partir dos modelos de </a:t>
+            </a:r>
+            <a:r>
+              <a:rPr lang="pt-BR" sz="2000" b="1" dirty="0">
+                <a:latin typeface="Trebuchet MS" panose="020B0603020202020204" pitchFamily="34" charset="0"/>
+              </a:rPr>
+              <a:t>K-</a:t>
+            </a:r>
+            <a:r>
+              <a:rPr lang="pt-BR" sz="2000" b="1" dirty="0" err="1">
                 <a:latin typeface="Trebuchet MS" panose="020B0603020202020204" pitchFamily="34" charset="0"/>
               </a:rPr>
               <a:t>means</a:t>
             </a:r>
             <a:r>
-              <a:rPr lang="pt-BR" sz="2400" dirty="0">
-                <a:latin typeface="Trebuchet MS" panose="020B0603020202020204" pitchFamily="34" charset="0"/>
-              </a:rPr>
-              <a:t> e PCA. As variáveis a serem utilizadas serão as mesma da análise supervisionada.</a:t>
+              <a:rPr lang="pt-BR" sz="2000" b="1" dirty="0">
+                <a:latin typeface="Trebuchet MS" panose="020B0603020202020204" pitchFamily="34" charset="0"/>
+              </a:rPr>
+              <a:t> e PCA</a:t>
+            </a:r>
+            <a:r>
+              <a:rPr lang="pt-BR" sz="2000" dirty="0">
+                <a:latin typeface="Trebuchet MS" panose="020B0603020202020204" pitchFamily="34" charset="0"/>
+              </a:rPr>
+              <a:t>. As variáveis a serem utilizadas serão as mesma da análise supervisionada.</a:t>
             </a:r>
           </a:p>
         </p:txBody>
@@ -4098,47 +4523,47 @@
         </p:nvSpPr>
         <p:spPr>
           <a:xfrm>
-            <a:off x="785004" y="577973"/>
+            <a:off x="785004" y="1173193"/>
             <a:ext cx="10397706" cy="1561380"/>
           </a:xfrm>
         </p:spPr>
         <p:txBody>
-          <a:bodyPr>
+          <a:bodyPr anchor="t">
             <a:noAutofit/>
           </a:bodyPr>
           <a:lstStyle/>
           <a:p>
             <a:pPr algn="l"/>
             <a:r>
-              <a:rPr lang="pt-BR" sz="2400" b="1" dirty="0">
+              <a:rPr lang="pt-BR" sz="2000" b="1" dirty="0">
                 <a:latin typeface="Trebuchet MS" panose="020B0603020202020204" pitchFamily="34" charset="0"/>
               </a:rPr>
               <a:t>4. Tratamento das Variáveis </a:t>
             </a:r>
             <a:br>
-              <a:rPr lang="pt-BR" sz="2400" b="1" dirty="0">
+              <a:rPr lang="pt-BR" sz="2000" b="1" dirty="0">
                 <a:latin typeface="Trebuchet MS" panose="020B0603020202020204" pitchFamily="34" charset="0"/>
               </a:rPr>
             </a:br>
             <a:br>
-              <a:rPr lang="pt-BR" sz="2400" dirty="0">
+              <a:rPr lang="pt-BR" sz="2000" dirty="0">
                 <a:latin typeface="Trebuchet MS" panose="020B0603020202020204" pitchFamily="34" charset="0"/>
               </a:rPr>
             </a:br>
             <a:r>
-              <a:rPr lang="pt-BR" sz="2400" dirty="0">
+              <a:rPr lang="pt-BR" sz="2000" dirty="0">
                 <a:latin typeface="Trebuchet MS" panose="020B0603020202020204" pitchFamily="34" charset="0"/>
               </a:rPr>
               <a:t>Da 43 variáveis do </a:t>
             </a:r>
             <a:r>
-              <a:rPr lang="pt-BR" sz="2400" dirty="0" err="1">
+              <a:rPr lang="pt-BR" sz="2000" dirty="0" err="1">
                 <a:latin typeface="Trebuchet MS" panose="020B0603020202020204" pitchFamily="34" charset="0"/>
               </a:rPr>
               <a:t>dataset</a:t>
             </a:r>
             <a:r>
-              <a:rPr lang="pt-BR" sz="2400" dirty="0">
+              <a:rPr lang="pt-BR" sz="2000" dirty="0">
                 <a:latin typeface="Trebuchet MS" panose="020B0603020202020204" pitchFamily="34" charset="0"/>
               </a:rPr>
               <a:t> original, serão mantidas 20 variáveis e 1 variável resposta, a saber:</a:t>
@@ -4160,7 +4585,7 @@
         </p:nvSpPr>
         <p:spPr>
           <a:xfrm>
-            <a:off x="1906436" y="2316192"/>
+            <a:off x="1906436" y="2592240"/>
             <a:ext cx="3729487" cy="3627408"/>
           </a:xfrm>
           <a:prstGeom prst="rect">
@@ -4168,7 +4593,7 @@
           </a:prstGeom>
         </p:spPr>
         <p:txBody>
-          <a:bodyPr vert="horz" lIns="91440" tIns="45720" rIns="91440" bIns="45720" rtlCol="0" anchor="b">
+          <a:bodyPr vert="horz" lIns="91440" tIns="45720" rIns="91440" bIns="45720" rtlCol="0" anchor="t">
             <a:noAutofit/>
           </a:bodyPr>
           <a:lstStyle/>
@@ -4184,7 +4609,7 @@
               <a:buChar char="•"/>
             </a:pPr>
             <a:r>
-              <a:rPr lang="en-US" sz="2400" dirty="0" err="1">
+              <a:rPr lang="en-US" sz="2000" dirty="0" err="1">
                 <a:solidFill>
                   <a:schemeClr val="tx1"/>
                 </a:solidFill>
@@ -4194,7 +4619,7 @@
               </a:rPr>
               <a:t>total_cup_points</a:t>
             </a:r>
-            <a:endParaRPr lang="en-US" sz="2400" dirty="0">
+            <a:endParaRPr lang="en-US" sz="2000" dirty="0">
               <a:solidFill>
                 <a:schemeClr val="tx1"/>
               </a:solidFill>
@@ -4215,7 +4640,7 @@
               <a:buChar char="•"/>
             </a:pPr>
             <a:r>
-              <a:rPr lang="en-US" sz="2400" dirty="0">
+              <a:rPr lang="en-US" sz="2000" dirty="0">
                 <a:solidFill>
                   <a:schemeClr val="tx1"/>
                 </a:solidFill>
@@ -4238,7 +4663,7 @@
               <a:buChar char="•"/>
             </a:pPr>
             <a:r>
-              <a:rPr lang="en-US" sz="2400" dirty="0" err="1">
+              <a:rPr lang="en-US" sz="2000" dirty="0" err="1">
                 <a:solidFill>
                   <a:schemeClr val="tx1"/>
                 </a:solidFill>
@@ -4248,7 +4673,7 @@
               </a:rPr>
               <a:t>country_of_origin</a:t>
             </a:r>
-            <a:endParaRPr lang="en-US" sz="2400" dirty="0">
+            <a:endParaRPr lang="en-US" sz="2000" dirty="0">
               <a:solidFill>
                 <a:schemeClr val="tx1"/>
               </a:solidFill>
@@ -4269,7 +4694,7 @@
               <a:buChar char="•"/>
             </a:pPr>
             <a:r>
-              <a:rPr lang="en-US" sz="2400" dirty="0" err="1">
+              <a:rPr lang="en-US" sz="2000" dirty="0" err="1">
                 <a:solidFill>
                   <a:schemeClr val="tx1"/>
                 </a:solidFill>
@@ -4279,7 +4704,7 @@
               </a:rPr>
               <a:t>processing_method</a:t>
             </a:r>
-            <a:endParaRPr lang="en-US" sz="2400" dirty="0">
+            <a:endParaRPr lang="en-US" sz="2000" dirty="0">
               <a:solidFill>
                 <a:schemeClr val="tx1"/>
               </a:solidFill>
@@ -4300,7 +4725,7 @@
               <a:buChar char="•"/>
             </a:pPr>
             <a:r>
-              <a:rPr lang="en-US" sz="2400" dirty="0">
+              <a:rPr lang="en-US" sz="2000" dirty="0">
                 <a:solidFill>
                   <a:schemeClr val="tx1"/>
                 </a:solidFill>
@@ -4323,7 +4748,7 @@
               <a:buChar char="•"/>
             </a:pPr>
             <a:r>
-              <a:rPr lang="en-US" sz="2400" dirty="0">
+              <a:rPr lang="en-US" sz="2000" dirty="0">
                 <a:solidFill>
                   <a:schemeClr val="tx1"/>
                 </a:solidFill>
@@ -4346,7 +4771,7 @@
               <a:buChar char="•"/>
             </a:pPr>
             <a:r>
-              <a:rPr lang="en-US" sz="2400" dirty="0">
+              <a:rPr lang="en-US" sz="2000" dirty="0">
                 <a:solidFill>
                   <a:schemeClr val="tx1"/>
                 </a:solidFill>
@@ -4369,7 +4794,7 @@
               <a:buChar char="•"/>
             </a:pPr>
             <a:r>
-              <a:rPr lang="en-US" sz="2400" dirty="0">
+              <a:rPr lang="en-US" sz="2000" dirty="0">
                 <a:solidFill>
                   <a:schemeClr val="tx1"/>
                 </a:solidFill>
@@ -4392,7 +4817,7 @@
               <a:buChar char="•"/>
             </a:pPr>
             <a:r>
-              <a:rPr lang="en-US" sz="2400" dirty="0">
+              <a:rPr lang="en-US" sz="2000" dirty="0">
                 <a:solidFill>
                   <a:schemeClr val="tx1"/>
                 </a:solidFill>
@@ -4415,7 +4840,7 @@
               <a:buChar char="•"/>
             </a:pPr>
             <a:r>
-              <a:rPr lang="en-US" sz="2400" dirty="0">
+              <a:rPr lang="en-US" sz="2000" dirty="0">
                 <a:solidFill>
                   <a:schemeClr val="tx1"/>
                 </a:solidFill>
@@ -4438,7 +4863,7 @@
               <a:buChar char="•"/>
             </a:pPr>
             <a:r>
-              <a:rPr lang="en-US" sz="2400" dirty="0">
+              <a:rPr lang="en-US" sz="2000" dirty="0">
                 <a:solidFill>
                   <a:schemeClr val="tx1"/>
                 </a:solidFill>
@@ -4465,7 +4890,7 @@
         </p:nvSpPr>
         <p:spPr>
           <a:xfrm>
-            <a:off x="5802700" y="2316192"/>
+            <a:off x="5802700" y="2592240"/>
             <a:ext cx="3729487" cy="3627408"/>
           </a:xfrm>
           <a:prstGeom prst="rect">
@@ -4473,7 +4898,7 @@
           </a:prstGeom>
         </p:spPr>
         <p:txBody>
-          <a:bodyPr vert="horz" lIns="91440" tIns="45720" rIns="91440" bIns="45720" rtlCol="0" anchor="b">
+          <a:bodyPr vert="horz" lIns="91440" tIns="45720" rIns="91440" bIns="45720" rtlCol="0" anchor="t">
             <a:noAutofit/>
           </a:bodyPr>
           <a:lstStyle/>
@@ -4489,7 +4914,7 @@
               <a:buChar char="•"/>
             </a:pPr>
             <a:r>
-              <a:rPr lang="en-US" sz="2400" dirty="0" err="1">
+              <a:rPr lang="en-US" sz="2000" dirty="0" err="1">
                 <a:solidFill>
                   <a:schemeClr val="tx1"/>
                 </a:solidFill>
@@ -4499,7 +4924,7 @@
               </a:rPr>
               <a:t>clean_cup</a:t>
             </a:r>
-            <a:endParaRPr lang="en-US" sz="2400" dirty="0">
+            <a:endParaRPr lang="en-US" sz="2000" dirty="0">
               <a:solidFill>
                 <a:schemeClr val="tx1"/>
               </a:solidFill>
@@ -4520,7 +4945,7 @@
               <a:buChar char="•"/>
             </a:pPr>
             <a:r>
-              <a:rPr lang="en-US" sz="2400" dirty="0">
+              <a:rPr lang="en-US" sz="2000" dirty="0">
                 <a:solidFill>
                   <a:schemeClr val="tx1"/>
                 </a:solidFill>
@@ -4543,7 +4968,7 @@
               <a:buChar char="•"/>
             </a:pPr>
             <a:r>
-              <a:rPr lang="en-US" sz="2400" dirty="0" err="1">
+              <a:rPr lang="en-US" sz="2000" dirty="0" err="1">
                 <a:solidFill>
                   <a:schemeClr val="tx1"/>
                 </a:solidFill>
@@ -4553,7 +4978,7 @@
               </a:rPr>
               <a:t>cupper_points</a:t>
             </a:r>
-            <a:endParaRPr lang="en-US" sz="2400" dirty="0">
+            <a:endParaRPr lang="en-US" sz="2000" dirty="0">
               <a:solidFill>
                 <a:schemeClr val="tx1"/>
               </a:solidFill>
@@ -4574,7 +4999,7 @@
               <a:buChar char="•"/>
             </a:pPr>
             <a:r>
-              <a:rPr lang="en-US" sz="2400" dirty="0">
+              <a:rPr lang="en-US" sz="2000" dirty="0">
                 <a:solidFill>
                   <a:schemeClr val="tx1"/>
                 </a:solidFill>
@@ -4597,7 +5022,7 @@
               <a:buChar char="•"/>
             </a:pPr>
             <a:r>
-              <a:rPr lang="en-US" sz="2400" dirty="0" err="1">
+              <a:rPr lang="en-US" sz="2000" dirty="0" err="1">
                 <a:solidFill>
                   <a:schemeClr val="tx1"/>
                 </a:solidFill>
@@ -4607,7 +5032,7 @@
               </a:rPr>
               <a:t>category_one_defects</a:t>
             </a:r>
-            <a:endParaRPr lang="en-US" sz="2400" dirty="0">
+            <a:endParaRPr lang="en-US" sz="2000" dirty="0">
               <a:solidFill>
                 <a:schemeClr val="tx1"/>
               </a:solidFill>
@@ -4628,7 +5053,7 @@
               <a:buChar char="•"/>
             </a:pPr>
             <a:r>
-              <a:rPr lang="en-US" sz="2400" dirty="0">
+              <a:rPr lang="en-US" sz="2000" dirty="0">
                 <a:solidFill>
                   <a:schemeClr val="tx1"/>
                 </a:solidFill>
@@ -4651,7 +5076,7 @@
               <a:buChar char="•"/>
             </a:pPr>
             <a:r>
-              <a:rPr lang="en-US" sz="2400" dirty="0">
+              <a:rPr lang="en-US" sz="2000" dirty="0">
                 <a:solidFill>
                   <a:schemeClr val="tx1"/>
                 </a:solidFill>
@@ -4674,7 +5099,7 @@
               <a:buChar char="•"/>
             </a:pPr>
             <a:r>
-              <a:rPr lang="en-US" sz="2400" dirty="0" err="1">
+              <a:rPr lang="en-US" sz="2000" dirty="0" err="1">
                 <a:solidFill>
                   <a:schemeClr val="tx1"/>
                 </a:solidFill>
@@ -4684,7 +5109,7 @@
               </a:rPr>
               <a:t>category_two_defects</a:t>
             </a:r>
-            <a:endParaRPr lang="en-US" sz="2400" dirty="0">
+            <a:endParaRPr lang="en-US" sz="2000" dirty="0">
               <a:solidFill>
                 <a:schemeClr val="tx1"/>
               </a:solidFill>
@@ -4705,7 +5130,7 @@
               <a:buChar char="•"/>
             </a:pPr>
             <a:r>
-              <a:rPr lang="en-US" sz="2400" dirty="0" err="1">
+              <a:rPr lang="en-US" sz="2000" dirty="0" err="1">
                 <a:solidFill>
                   <a:schemeClr val="tx1"/>
                 </a:solidFill>
@@ -4715,7 +5140,7 @@
               </a:rPr>
               <a:t>unit_of_measurement</a:t>
             </a:r>
-            <a:endParaRPr lang="en-US" sz="2400" dirty="0">
+            <a:endParaRPr lang="en-US" sz="2000" dirty="0">
               <a:solidFill>
                 <a:schemeClr val="tx1"/>
               </a:solidFill>
@@ -4736,7 +5161,7 @@
               <a:buChar char="•"/>
             </a:pPr>
             <a:r>
-              <a:rPr lang="en-US" sz="2400" dirty="0" err="1">
+              <a:rPr lang="en-US" sz="2000" dirty="0" err="1">
                 <a:solidFill>
                   <a:schemeClr val="tx1"/>
                 </a:solidFill>
@@ -4746,7 +5171,7 @@
               </a:rPr>
               <a:t>altitude_mean_meters</a:t>
             </a:r>
-            <a:endParaRPr lang="en-US" sz="2400" dirty="0">
+            <a:endParaRPr lang="en-US" sz="2000" dirty="0">
               <a:solidFill>
                 <a:schemeClr val="tx1"/>
               </a:solidFill>
@@ -4766,7 +5191,7 @@
               <a:buFont typeface="Arial" panose="020B0604020202020204" pitchFamily="34" charset="0"/>
               <a:buChar char="•"/>
             </a:pPr>
-            <a:endParaRPr lang="pt-BR" sz="2400" dirty="0">
+            <a:endParaRPr lang="pt-BR" sz="2000" dirty="0">
               <a:solidFill>
                 <a:schemeClr val="tx1"/>
               </a:solidFill>
@@ -4825,450 +5250,450 @@
         </p:nvSpPr>
         <p:spPr>
           <a:xfrm>
-            <a:off x="785004" y="577972"/>
-            <a:ext cx="10397706" cy="5495024"/>
-          </a:xfrm>
-        </p:spPr>
-        <p:txBody>
-          <a:bodyPr>
+            <a:off x="785004" y="793627"/>
+            <a:ext cx="10397706" cy="4718652"/>
+          </a:xfrm>
+        </p:spPr>
+        <p:txBody>
+          <a:bodyPr anchor="ctr">
             <a:noAutofit/>
           </a:bodyPr>
           <a:lstStyle/>
           <a:p>
             <a:pPr algn="l"/>
             <a:r>
-              <a:rPr lang="pt-BR" sz="2400" b="1" dirty="0">
+              <a:rPr lang="pt-BR" sz="2000" b="1" dirty="0">
                 <a:latin typeface="Trebuchet MS" panose="020B0603020202020204" pitchFamily="34" charset="0"/>
               </a:rPr>
               <a:t>4. Tratamento das Variáveis </a:t>
             </a:r>
             <a:br>
-              <a:rPr lang="pt-BR" sz="2400" b="1" dirty="0">
+              <a:rPr lang="pt-BR" sz="2000" b="1" dirty="0">
                 <a:latin typeface="Trebuchet MS" panose="020B0603020202020204" pitchFamily="34" charset="0"/>
               </a:rPr>
             </a:br>
             <a:br>
-              <a:rPr lang="pt-BR" sz="2400" dirty="0">
+              <a:rPr lang="pt-BR" sz="2000" dirty="0">
                 <a:latin typeface="Trebuchet MS" panose="020B0603020202020204" pitchFamily="34" charset="0"/>
               </a:rPr>
             </a:br>
             <a:r>
-              <a:rPr lang="pt-BR" sz="2400" dirty="0">
+              <a:rPr lang="pt-BR" sz="2000" dirty="0">
                 <a:latin typeface="Trebuchet MS" panose="020B0603020202020204" pitchFamily="34" charset="0"/>
               </a:rPr>
               <a:t>Essas variáveis foram mantidas, pois possuem informações consideradas na pontuação de cada café (</a:t>
             </a:r>
             <a:r>
-              <a:rPr lang="en-US" sz="2400" dirty="0">
+              <a:rPr lang="en-US" sz="2000" dirty="0">
                 <a:latin typeface="Trebuchet MS" panose="020B0603020202020204" pitchFamily="34" charset="0"/>
               </a:rPr>
               <a:t>aroma, flavor, aftertaste, acidity, body, balance, uniformity, </a:t>
             </a:r>
             <a:r>
-              <a:rPr lang="en-US" sz="2400" dirty="0" err="1">
+              <a:rPr lang="en-US" sz="2000" dirty="0" err="1">
                 <a:latin typeface="Trebuchet MS" panose="020B0603020202020204" pitchFamily="34" charset="0"/>
               </a:rPr>
               <a:t>clean_cup</a:t>
             </a:r>
             <a:r>
-              <a:rPr lang="en-US" sz="2400" dirty="0">
+              <a:rPr lang="en-US" sz="2000" dirty="0">
                 <a:latin typeface="Trebuchet MS" panose="020B0603020202020204" pitchFamily="34" charset="0"/>
               </a:rPr>
               <a:t>, sweetness, </a:t>
             </a:r>
             <a:r>
-              <a:rPr lang="en-US" sz="2400" dirty="0" err="1">
+              <a:rPr lang="en-US" sz="2000" dirty="0" err="1">
                 <a:latin typeface="Trebuchet MS" panose="020B0603020202020204" pitchFamily="34" charset="0"/>
               </a:rPr>
               <a:t>cupper_points</a:t>
             </a:r>
             <a:r>
-              <a:rPr lang="en-US" sz="2400" dirty="0">
+              <a:rPr lang="en-US" sz="2000" dirty="0">
                 <a:latin typeface="Trebuchet MS" panose="020B0603020202020204" pitchFamily="34" charset="0"/>
               </a:rPr>
               <a:t>, moisture, </a:t>
             </a:r>
             <a:r>
-              <a:rPr lang="en-US" sz="2400" dirty="0" err="1">
+              <a:rPr lang="en-US" sz="2000" dirty="0" err="1">
                 <a:latin typeface="Trebuchet MS" panose="020B0603020202020204" pitchFamily="34" charset="0"/>
               </a:rPr>
               <a:t>category_one_defects</a:t>
             </a:r>
             <a:r>
-              <a:rPr lang="en-US" sz="2400" dirty="0">
+              <a:rPr lang="en-US" sz="2000" dirty="0">
                 <a:latin typeface="Trebuchet MS" panose="020B0603020202020204" pitchFamily="34" charset="0"/>
               </a:rPr>
               <a:t>, quakers, color, </a:t>
             </a:r>
             <a:r>
-              <a:rPr lang="en-US" sz="2400" dirty="0" err="1">
+              <a:rPr lang="en-US" sz="2000" dirty="0" err="1">
                 <a:latin typeface="Trebuchet MS" panose="020B0603020202020204" pitchFamily="34" charset="0"/>
               </a:rPr>
               <a:t>category_two_defects</a:t>
             </a:r>
             <a:r>
-              <a:rPr lang="en-US" sz="2400" dirty="0">
+              <a:rPr lang="en-US" sz="2000" dirty="0">
                 <a:latin typeface="Trebuchet MS" panose="020B0603020202020204" pitchFamily="34" charset="0"/>
               </a:rPr>
               <a:t>)</a:t>
             </a:r>
             <a:r>
-              <a:rPr lang="pt-BR" sz="2400" dirty="0">
+              <a:rPr lang="pt-BR" sz="2000" dirty="0">
                 <a:latin typeface="Trebuchet MS" panose="020B0603020202020204" pitchFamily="34" charset="0"/>
               </a:rPr>
               <a:t> e são variáveis majoritariamente numéricas.</a:t>
             </a:r>
             <a:br>
-              <a:rPr lang="pt-BR" sz="2400" dirty="0">
+              <a:rPr lang="pt-BR" sz="2000" dirty="0">
                 <a:latin typeface="Trebuchet MS" panose="020B0603020202020204" pitchFamily="34" charset="0"/>
               </a:rPr>
             </a:br>
             <a:br>
-              <a:rPr lang="pt-BR" sz="2400" dirty="0">
+              <a:rPr lang="pt-BR" sz="2000" dirty="0">
                 <a:latin typeface="Trebuchet MS" panose="020B0603020202020204" pitchFamily="34" charset="0"/>
               </a:rPr>
             </a:br>
             <a:r>
-              <a:rPr lang="pt-BR" sz="2400" dirty="0">
+              <a:rPr lang="pt-BR" sz="2000" dirty="0">
                 <a:latin typeface="Trebuchet MS" panose="020B0603020202020204" pitchFamily="34" charset="0"/>
               </a:rPr>
               <a:t>Além disso, para as variáveis categóricas, estas serão convertidas em </a:t>
             </a:r>
             <a:r>
-              <a:rPr lang="pt-BR" sz="2400" dirty="0" err="1">
+              <a:rPr lang="pt-BR" sz="2000" dirty="0" err="1">
                 <a:latin typeface="Trebuchet MS" panose="020B0603020202020204" pitchFamily="34" charset="0"/>
               </a:rPr>
               <a:t>dummy</a:t>
             </a:r>
             <a:r>
-              <a:rPr lang="pt-BR" sz="2400" dirty="0">
+              <a:rPr lang="pt-BR" sz="2000" dirty="0">
                 <a:latin typeface="Trebuchet MS" panose="020B0603020202020204" pitchFamily="34" charset="0"/>
               </a:rPr>
               <a:t> (</a:t>
             </a:r>
             <a:r>
-              <a:rPr lang="en-US" sz="2400" dirty="0">
+              <a:rPr lang="en-US" sz="2000" dirty="0">
                 <a:latin typeface="Trebuchet MS" panose="020B0603020202020204" pitchFamily="34" charset="0"/>
               </a:rPr>
               <a:t>species, </a:t>
             </a:r>
             <a:r>
-              <a:rPr lang="en-US" sz="2400" dirty="0" err="1">
+              <a:rPr lang="en-US" sz="2000" dirty="0" err="1">
                 <a:latin typeface="Trebuchet MS" panose="020B0603020202020204" pitchFamily="34" charset="0"/>
               </a:rPr>
               <a:t>country_of_origin</a:t>
             </a:r>
             <a:r>
-              <a:rPr lang="en-US" sz="2400" dirty="0">
+              <a:rPr lang="en-US" sz="2000" dirty="0">
                 <a:latin typeface="Trebuchet MS" panose="020B0603020202020204" pitchFamily="34" charset="0"/>
               </a:rPr>
               <a:t>, </a:t>
             </a:r>
             <a:r>
-              <a:rPr lang="en-US" sz="2400" dirty="0" err="1">
+              <a:rPr lang="en-US" sz="2000" dirty="0" err="1">
                 <a:latin typeface="Trebuchet MS" panose="020B0603020202020204" pitchFamily="34" charset="0"/>
               </a:rPr>
               <a:t>processing_method</a:t>
             </a:r>
             <a:r>
-              <a:rPr lang="en-US" sz="2400" dirty="0">
+              <a:rPr lang="en-US" sz="2000" dirty="0">
                 <a:latin typeface="Trebuchet MS" panose="020B0603020202020204" pitchFamily="34" charset="0"/>
               </a:rPr>
               <a:t>, color). </a:t>
             </a:r>
             <a:r>
-              <a:rPr lang="en-US" sz="2400" dirty="0" err="1">
+              <a:rPr lang="en-US" sz="2000" dirty="0" err="1">
                 <a:latin typeface="Trebuchet MS" panose="020B0603020202020204" pitchFamily="34" charset="0"/>
               </a:rPr>
               <a:t>Ressalta</a:t>
             </a:r>
             <a:r>
-              <a:rPr lang="en-US" sz="2400" dirty="0">
+              <a:rPr lang="en-US" sz="2000" dirty="0">
                 <a:latin typeface="Trebuchet MS" panose="020B0603020202020204" pitchFamily="34" charset="0"/>
               </a:rPr>
               <a:t>-se que para a </a:t>
             </a:r>
             <a:r>
-              <a:rPr lang="en-US" sz="2400" dirty="0" err="1">
+              <a:rPr lang="en-US" sz="2000" dirty="0" err="1">
                 <a:latin typeface="Trebuchet MS" panose="020B0603020202020204" pitchFamily="34" charset="0"/>
               </a:rPr>
               <a:t>variável</a:t>
             </a:r>
             <a:r>
-              <a:rPr lang="en-US" sz="2400" dirty="0">
+              <a:rPr lang="en-US" sz="2000" dirty="0">
                 <a:latin typeface="Trebuchet MS" panose="020B0603020202020204" pitchFamily="34" charset="0"/>
               </a:rPr>
               <a:t> </a:t>
             </a:r>
             <a:r>
-              <a:rPr lang="en-US" sz="2400" dirty="0" err="1">
+              <a:rPr lang="en-US" sz="2000" dirty="0" err="1">
                 <a:latin typeface="Trebuchet MS" panose="020B0603020202020204" pitchFamily="34" charset="0"/>
               </a:rPr>
               <a:t>country_of_origin</a:t>
             </a:r>
             <a:r>
-              <a:rPr lang="en-US" sz="2400" dirty="0">
+              <a:rPr lang="en-US" sz="2000" dirty="0">
                 <a:latin typeface="Trebuchet MS" panose="020B0603020202020204" pitchFamily="34" charset="0"/>
               </a:rPr>
               <a:t> </a:t>
             </a:r>
             <a:r>
-              <a:rPr lang="en-US" sz="2400" dirty="0" err="1">
+              <a:rPr lang="en-US" sz="2000" dirty="0" err="1">
                 <a:latin typeface="Trebuchet MS" panose="020B0603020202020204" pitchFamily="34" charset="0"/>
               </a:rPr>
               <a:t>serão</a:t>
             </a:r>
             <a:r>
-              <a:rPr lang="en-US" sz="2400" dirty="0">
+              <a:rPr lang="en-US" sz="2000" dirty="0">
                 <a:latin typeface="Trebuchet MS" panose="020B0603020202020204" pitchFamily="34" charset="0"/>
               </a:rPr>
               <a:t> </a:t>
             </a:r>
             <a:r>
-              <a:rPr lang="en-US" sz="2400" dirty="0" err="1">
+              <a:rPr lang="en-US" sz="2000" dirty="0" err="1">
                 <a:latin typeface="Trebuchet MS" panose="020B0603020202020204" pitchFamily="34" charset="0"/>
               </a:rPr>
               <a:t>transformadas</a:t>
             </a:r>
             <a:r>
-              <a:rPr lang="en-US" sz="2400" dirty="0">
+              <a:rPr lang="en-US" sz="2000" dirty="0">
                 <a:latin typeface="Trebuchet MS" panose="020B0603020202020204" pitchFamily="34" charset="0"/>
               </a:rPr>
               <a:t> </a:t>
             </a:r>
             <a:r>
-              <a:rPr lang="en-US" sz="2400" dirty="0" err="1">
+              <a:rPr lang="en-US" sz="2000" dirty="0" err="1">
                 <a:latin typeface="Trebuchet MS" panose="020B0603020202020204" pitchFamily="34" charset="0"/>
               </a:rPr>
               <a:t>somente</a:t>
             </a:r>
             <a:r>
-              <a:rPr lang="en-US" sz="2400" dirty="0">
+              <a:rPr lang="en-US" sz="2000" dirty="0">
                 <a:latin typeface="Trebuchet MS" panose="020B0603020202020204" pitchFamily="34" charset="0"/>
               </a:rPr>
               <a:t> </a:t>
             </a:r>
             <a:r>
-              <a:rPr lang="en-US" sz="2400" dirty="0" err="1">
+              <a:rPr lang="en-US" sz="2000" dirty="0" err="1">
                 <a:latin typeface="Trebuchet MS" panose="020B0603020202020204" pitchFamily="34" charset="0"/>
               </a:rPr>
               <a:t>em</a:t>
             </a:r>
             <a:r>
-              <a:rPr lang="en-US" sz="2400" dirty="0">
+              <a:rPr lang="en-US" sz="2000" dirty="0">
                 <a:latin typeface="Trebuchet MS" panose="020B0603020202020204" pitchFamily="34" charset="0"/>
               </a:rPr>
               <a:t> 4 </a:t>
             </a:r>
             <a:r>
-              <a:rPr lang="en-US" sz="2400" dirty="0" err="1">
+              <a:rPr lang="en-US" sz="2000" dirty="0" err="1">
                 <a:latin typeface="Trebuchet MS" panose="020B0603020202020204" pitchFamily="34" charset="0"/>
               </a:rPr>
               <a:t>variáveis</a:t>
             </a:r>
             <a:r>
-              <a:rPr lang="en-US" sz="2400" dirty="0">
+              <a:rPr lang="en-US" sz="2000" dirty="0">
                 <a:latin typeface="Trebuchet MS" panose="020B0603020202020204" pitchFamily="34" charset="0"/>
               </a:rPr>
               <a:t> dummy, 3 com a </a:t>
             </a:r>
             <a:r>
-              <a:rPr lang="en-US" sz="2400" dirty="0" err="1">
+              <a:rPr lang="en-US" sz="2000" dirty="0" err="1">
                 <a:latin typeface="Trebuchet MS" panose="020B0603020202020204" pitchFamily="34" charset="0"/>
               </a:rPr>
               <a:t>maior</a:t>
             </a:r>
             <a:r>
-              <a:rPr lang="en-US" sz="2400" dirty="0">
+              <a:rPr lang="en-US" sz="2000" dirty="0">
                 <a:latin typeface="Trebuchet MS" panose="020B0603020202020204" pitchFamily="34" charset="0"/>
               </a:rPr>
               <a:t> </a:t>
             </a:r>
             <a:r>
-              <a:rPr lang="en-US" sz="2400" dirty="0" err="1">
+              <a:rPr lang="en-US" sz="2000" dirty="0" err="1">
                 <a:latin typeface="Trebuchet MS" panose="020B0603020202020204" pitchFamily="34" charset="0"/>
               </a:rPr>
               <a:t>frequência</a:t>
             </a:r>
             <a:r>
-              <a:rPr lang="en-US" sz="2400" dirty="0">
+              <a:rPr lang="en-US" sz="2000" dirty="0">
                 <a:latin typeface="Trebuchet MS" panose="020B0603020202020204" pitchFamily="34" charset="0"/>
               </a:rPr>
               <a:t> de </a:t>
             </a:r>
             <a:r>
-              <a:rPr lang="en-US" sz="2400" dirty="0" err="1">
+              <a:rPr lang="en-US" sz="2000" dirty="0" err="1">
                 <a:latin typeface="Trebuchet MS" panose="020B0603020202020204" pitchFamily="34" charset="0"/>
               </a:rPr>
               <a:t>países</a:t>
             </a:r>
             <a:r>
-              <a:rPr lang="en-US" sz="2400" dirty="0">
+              <a:rPr lang="en-US" sz="2000" dirty="0">
                 <a:latin typeface="Trebuchet MS" panose="020B0603020202020204" pitchFamily="34" charset="0"/>
               </a:rPr>
               <a:t> e a </a:t>
             </a:r>
             <a:r>
-              <a:rPr lang="en-US" sz="2400" dirty="0" err="1">
+              <a:rPr lang="en-US" sz="2000" dirty="0" err="1">
                 <a:latin typeface="Trebuchet MS" panose="020B0603020202020204" pitchFamily="34" charset="0"/>
               </a:rPr>
               <a:t>última</a:t>
             </a:r>
             <a:r>
-              <a:rPr lang="en-US" sz="2400" dirty="0">
+              <a:rPr lang="en-US" sz="2000" dirty="0">
                 <a:latin typeface="Trebuchet MS" panose="020B0603020202020204" pitchFamily="34" charset="0"/>
               </a:rPr>
               <a:t> </a:t>
             </a:r>
             <a:r>
-              <a:rPr lang="en-US" sz="2400" dirty="0" err="1">
+              <a:rPr lang="en-US" sz="2000" dirty="0" err="1">
                 <a:latin typeface="Trebuchet MS" panose="020B0603020202020204" pitchFamily="34" charset="0"/>
               </a:rPr>
               <a:t>como</a:t>
             </a:r>
             <a:r>
-              <a:rPr lang="en-US" sz="2400" dirty="0">
+              <a:rPr lang="en-US" sz="2000" dirty="0">
                 <a:latin typeface="Trebuchet MS" panose="020B0603020202020204" pitchFamily="34" charset="0"/>
               </a:rPr>
               <a:t> “Outros”.</a:t>
             </a:r>
             <a:br>
-              <a:rPr lang="en-US" sz="2400" dirty="0">
+              <a:rPr lang="en-US" sz="2000" dirty="0">
                 <a:latin typeface="Trebuchet MS" panose="020B0603020202020204" pitchFamily="34" charset="0"/>
               </a:rPr>
             </a:br>
             <a:br>
-              <a:rPr lang="en-US" sz="2400" dirty="0">
+              <a:rPr lang="en-US" sz="2000" dirty="0">
                 <a:latin typeface="Trebuchet MS" panose="020B0603020202020204" pitchFamily="34" charset="0"/>
               </a:rPr>
             </a:br>
             <a:r>
-              <a:rPr lang="en-US" sz="2400" dirty="0">
+              <a:rPr lang="en-US" sz="2000" dirty="0">
                 <a:latin typeface="Trebuchet MS" panose="020B0603020202020204" pitchFamily="34" charset="0"/>
               </a:rPr>
               <a:t>A </a:t>
             </a:r>
             <a:r>
-              <a:rPr lang="en-US" sz="2400" dirty="0" err="1">
+              <a:rPr lang="en-US" sz="2000" dirty="0" err="1">
                 <a:latin typeface="Trebuchet MS" panose="020B0603020202020204" pitchFamily="34" charset="0"/>
               </a:rPr>
               <a:t>variável</a:t>
             </a:r>
             <a:r>
-              <a:rPr lang="en-US" sz="2400" dirty="0">
+              <a:rPr lang="en-US" sz="2000" dirty="0">
                 <a:latin typeface="Trebuchet MS" panose="020B0603020202020204" pitchFamily="34" charset="0"/>
               </a:rPr>
               <a:t> </a:t>
             </a:r>
             <a:r>
-              <a:rPr lang="en-US" sz="2400" dirty="0" err="1">
+              <a:rPr lang="en-US" sz="2000" dirty="0" err="1">
                 <a:latin typeface="Trebuchet MS" panose="020B0603020202020204" pitchFamily="34" charset="0"/>
               </a:rPr>
               <a:t>unit_of_measurement</a:t>
             </a:r>
             <a:r>
-              <a:rPr lang="en-US" sz="2400" dirty="0">
+              <a:rPr lang="en-US" sz="2000" dirty="0">
                 <a:latin typeface="Trebuchet MS" panose="020B0603020202020204" pitchFamily="34" charset="0"/>
               </a:rPr>
               <a:t> </a:t>
             </a:r>
             <a:r>
-              <a:rPr lang="en-US" sz="2400" dirty="0" err="1">
+              <a:rPr lang="en-US" sz="2000" dirty="0" err="1">
                 <a:latin typeface="Trebuchet MS" panose="020B0603020202020204" pitchFamily="34" charset="0"/>
               </a:rPr>
               <a:t>será</a:t>
             </a:r>
             <a:r>
-              <a:rPr lang="en-US" sz="2400" dirty="0">
+              <a:rPr lang="en-US" sz="2000" dirty="0">
                 <a:latin typeface="Trebuchet MS" panose="020B0603020202020204" pitchFamily="34" charset="0"/>
               </a:rPr>
               <a:t> </a:t>
             </a:r>
             <a:r>
-              <a:rPr lang="en-US" sz="2400" dirty="0" err="1">
+              <a:rPr lang="en-US" sz="2000" dirty="0" err="1">
                 <a:latin typeface="Trebuchet MS" panose="020B0603020202020204" pitchFamily="34" charset="0"/>
               </a:rPr>
               <a:t>utilizada</a:t>
             </a:r>
             <a:r>
-              <a:rPr lang="en-US" sz="2400" dirty="0">
+              <a:rPr lang="en-US" sz="2000" dirty="0">
                 <a:latin typeface="Trebuchet MS" panose="020B0603020202020204" pitchFamily="34" charset="0"/>
               </a:rPr>
               <a:t> </a:t>
             </a:r>
             <a:r>
-              <a:rPr lang="en-US" sz="2400" dirty="0" err="1">
+              <a:rPr lang="en-US" sz="2000" dirty="0" err="1">
                 <a:latin typeface="Trebuchet MS" panose="020B0603020202020204" pitchFamily="34" charset="0"/>
               </a:rPr>
               <a:t>apenas</a:t>
             </a:r>
             <a:r>
-              <a:rPr lang="en-US" sz="2400" dirty="0">
+              <a:rPr lang="en-US" sz="2000" dirty="0">
                 <a:latin typeface="Trebuchet MS" panose="020B0603020202020204" pitchFamily="34" charset="0"/>
               </a:rPr>
               <a:t> para transformer a </a:t>
             </a:r>
             <a:r>
-              <a:rPr lang="en-US" sz="2400" dirty="0" err="1">
+              <a:rPr lang="en-US" sz="2000" dirty="0" err="1">
                 <a:latin typeface="Trebuchet MS" panose="020B0603020202020204" pitchFamily="34" charset="0"/>
               </a:rPr>
               <a:t>variável</a:t>
             </a:r>
             <a:r>
-              <a:rPr lang="en-US" sz="2400" dirty="0">
+              <a:rPr lang="en-US" sz="2000" dirty="0">
                 <a:latin typeface="Trebuchet MS" panose="020B0603020202020204" pitchFamily="34" charset="0"/>
               </a:rPr>
               <a:t> </a:t>
             </a:r>
             <a:r>
-              <a:rPr lang="en-US" sz="2400" dirty="0" err="1">
+              <a:rPr lang="en-US" sz="2000" dirty="0" err="1">
                 <a:latin typeface="Trebuchet MS" panose="020B0603020202020204" pitchFamily="34" charset="0"/>
               </a:rPr>
               <a:t>altitude_mean_meters</a:t>
             </a:r>
             <a:r>
-              <a:rPr lang="en-US" sz="2400" dirty="0">
+              <a:rPr lang="en-US" sz="2000" dirty="0">
                 <a:latin typeface="Trebuchet MS" panose="020B0603020202020204" pitchFamily="34" charset="0"/>
               </a:rPr>
               <a:t> </a:t>
             </a:r>
             <a:r>
-              <a:rPr lang="en-US" sz="2400" dirty="0" err="1">
+              <a:rPr lang="en-US" sz="2000" dirty="0" err="1">
                 <a:latin typeface="Trebuchet MS" panose="020B0603020202020204" pitchFamily="34" charset="0"/>
               </a:rPr>
               <a:t>na</a:t>
             </a:r>
             <a:r>
-              <a:rPr lang="en-US" sz="2400" dirty="0">
+              <a:rPr lang="en-US" sz="2000" dirty="0">
                 <a:latin typeface="Trebuchet MS" panose="020B0603020202020204" pitchFamily="34" charset="0"/>
               </a:rPr>
               <a:t> </a:t>
             </a:r>
             <a:r>
-              <a:rPr lang="en-US" sz="2400" dirty="0" err="1">
+              <a:rPr lang="en-US" sz="2000" dirty="0" err="1">
                 <a:latin typeface="Trebuchet MS" panose="020B0603020202020204" pitchFamily="34" charset="0"/>
               </a:rPr>
               <a:t>mesma</a:t>
             </a:r>
             <a:r>
-              <a:rPr lang="en-US" sz="2400" dirty="0">
+              <a:rPr lang="en-US" sz="2000" dirty="0">
                 <a:latin typeface="Trebuchet MS" panose="020B0603020202020204" pitchFamily="34" charset="0"/>
               </a:rPr>
               <a:t> base de </a:t>
             </a:r>
             <a:r>
-              <a:rPr lang="en-US" sz="2400" dirty="0" err="1">
+              <a:rPr lang="en-US" sz="2000" dirty="0" err="1">
                 <a:latin typeface="Trebuchet MS" panose="020B0603020202020204" pitchFamily="34" charset="0"/>
               </a:rPr>
               <a:t>medida</a:t>
             </a:r>
             <a:r>
-              <a:rPr lang="en-US" sz="2400" dirty="0">
+              <a:rPr lang="en-US" sz="2000" dirty="0">
                 <a:latin typeface="Trebuchet MS" panose="020B0603020202020204" pitchFamily="34" charset="0"/>
               </a:rPr>
               <a:t>.</a:t>
             </a:r>
-            <a:endParaRPr lang="pt-BR" sz="2400" dirty="0">
+            <a:endParaRPr lang="pt-BR" sz="2000" dirty="0">
               <a:latin typeface="Trebuchet MS" panose="020B0603020202020204" pitchFamily="34" charset="0"/>
             </a:endParaRPr>
           </a:p>
@@ -5322,624 +5747,624 @@
         </p:nvSpPr>
         <p:spPr>
           <a:xfrm>
-            <a:off x="785004" y="577972"/>
-            <a:ext cx="10397706" cy="5702058"/>
-          </a:xfrm>
-        </p:spPr>
-        <p:txBody>
-          <a:bodyPr>
+            <a:off x="785004" y="1216324"/>
+            <a:ext cx="10397706" cy="5270737"/>
+          </a:xfrm>
+        </p:spPr>
+        <p:txBody>
+          <a:bodyPr anchor="t">
             <a:noAutofit/>
           </a:bodyPr>
           <a:lstStyle/>
           <a:p>
             <a:pPr algn="l"/>
             <a:r>
-              <a:rPr lang="pt-BR" sz="2400" b="1" dirty="0">
+              <a:rPr lang="pt-BR" sz="2000" b="1" dirty="0">
                 <a:latin typeface="Trebuchet MS" panose="020B0603020202020204" pitchFamily="34" charset="0"/>
               </a:rPr>
               <a:t>4. Tratamento das Variáveis </a:t>
             </a:r>
             <a:br>
-              <a:rPr lang="pt-BR" sz="2400" b="1" dirty="0">
+              <a:rPr lang="pt-BR" sz="2000" b="1" dirty="0">
                 <a:latin typeface="Trebuchet MS" panose="020B0603020202020204" pitchFamily="34" charset="0"/>
               </a:rPr>
             </a:br>
             <a:br>
-              <a:rPr lang="pt-BR" sz="2400" dirty="0">
+              <a:rPr lang="pt-BR" sz="2000" dirty="0">
                 <a:latin typeface="Trebuchet MS" panose="020B0603020202020204" pitchFamily="34" charset="0"/>
               </a:rPr>
             </a:br>
             <a:r>
-              <a:rPr lang="pt-BR" sz="2400" dirty="0">
+              <a:rPr lang="pt-BR" sz="2000" dirty="0">
                 <a:latin typeface="Trebuchet MS" panose="020B0603020202020204" pitchFamily="34" charset="0"/>
               </a:rPr>
               <a:t>As demais variáveis foram excluídas por serem categóricas e não trazerem informação relevante para a qualidade do café, especialmente aqueles relacionadas ao produtor, certificador, tamanho do lote e local de produção do café.</a:t>
             </a:r>
             <a:br>
-              <a:rPr lang="pt-BR" sz="2400" dirty="0">
+              <a:rPr lang="pt-BR" sz="2000" dirty="0">
                 <a:latin typeface="Trebuchet MS" panose="020B0603020202020204" pitchFamily="34" charset="0"/>
               </a:rPr>
             </a:br>
             <a:br>
-              <a:rPr lang="pt-BR" sz="2400" dirty="0">
+              <a:rPr lang="pt-BR" sz="2000" dirty="0">
                 <a:latin typeface="Trebuchet MS" panose="020B0603020202020204" pitchFamily="34" charset="0"/>
               </a:rPr>
             </a:br>
             <a:r>
-              <a:rPr lang="pt-BR" sz="2400" dirty="0">
+              <a:rPr lang="pt-BR" sz="2000" dirty="0">
                 <a:latin typeface="Trebuchet MS" panose="020B0603020202020204" pitchFamily="34" charset="0"/>
               </a:rPr>
               <a:t>Também foram excluídas as variáveis de data (</a:t>
             </a:r>
             <a:r>
-              <a:rPr lang="en-US" sz="2400" dirty="0" err="1">
+              <a:rPr lang="en-US" sz="2000" dirty="0" err="1">
                 <a:latin typeface="Trebuchet MS" panose="020B0603020202020204" pitchFamily="34" charset="0"/>
               </a:rPr>
               <a:t>harvest_year</a:t>
             </a:r>
             <a:r>
-              <a:rPr lang="en-US" sz="2400" dirty="0">
+              <a:rPr lang="en-US" sz="2000" dirty="0">
                 <a:latin typeface="Trebuchet MS" panose="020B0603020202020204" pitchFamily="34" charset="0"/>
               </a:rPr>
               <a:t>, </a:t>
             </a:r>
             <a:r>
-              <a:rPr lang="en-US" sz="2400" dirty="0" err="1">
+              <a:rPr lang="en-US" sz="2000" dirty="0" err="1">
                 <a:latin typeface="Trebuchet MS" panose="020B0603020202020204" pitchFamily="34" charset="0"/>
               </a:rPr>
               <a:t>grading_date</a:t>
             </a:r>
             <a:r>
-              <a:rPr lang="en-US" sz="2400" dirty="0">
+              <a:rPr lang="en-US" sz="2000" dirty="0">
                 <a:latin typeface="Trebuchet MS" panose="020B0603020202020204" pitchFamily="34" charset="0"/>
               </a:rPr>
               <a:t>, expiration), </a:t>
             </a:r>
             <a:r>
-              <a:rPr lang="en-US" sz="2400" dirty="0" err="1">
+              <a:rPr lang="en-US" sz="2000" dirty="0" err="1">
                 <a:latin typeface="Trebuchet MS" panose="020B0603020202020204" pitchFamily="34" charset="0"/>
               </a:rPr>
               <a:t>seja</a:t>
             </a:r>
             <a:r>
-              <a:rPr lang="en-US" sz="2400" dirty="0">
+              <a:rPr lang="en-US" sz="2000" dirty="0">
                 <a:latin typeface="Trebuchet MS" panose="020B0603020202020204" pitchFamily="34" charset="0"/>
               </a:rPr>
               <a:t> pela </a:t>
             </a:r>
             <a:r>
-              <a:rPr lang="en-US" sz="2400" dirty="0" err="1">
+              <a:rPr lang="en-US" sz="2000" dirty="0" err="1">
                 <a:latin typeface="Trebuchet MS" panose="020B0603020202020204" pitchFamily="34" charset="0"/>
               </a:rPr>
               <a:t>qualidade</a:t>
             </a:r>
             <a:r>
-              <a:rPr lang="en-US" sz="2400" dirty="0">
+              <a:rPr lang="en-US" sz="2000" dirty="0">
                 <a:latin typeface="Trebuchet MS" panose="020B0603020202020204" pitchFamily="34" charset="0"/>
               </a:rPr>
               <a:t> das </a:t>
             </a:r>
             <a:r>
-              <a:rPr lang="en-US" sz="2400" dirty="0" err="1">
+              <a:rPr lang="en-US" sz="2000" dirty="0" err="1">
                 <a:latin typeface="Trebuchet MS" panose="020B0603020202020204" pitchFamily="34" charset="0"/>
               </a:rPr>
               <a:t>informações</a:t>
             </a:r>
             <a:r>
-              <a:rPr lang="en-US" sz="2400" dirty="0">
+              <a:rPr lang="en-US" sz="2000" dirty="0">
                 <a:latin typeface="Trebuchet MS" panose="020B0603020202020204" pitchFamily="34" charset="0"/>
               </a:rPr>
               <a:t>, </a:t>
             </a:r>
             <a:r>
-              <a:rPr lang="en-US" sz="2400" dirty="0" err="1">
+              <a:rPr lang="en-US" sz="2000" dirty="0" err="1">
                 <a:latin typeface="Trebuchet MS" panose="020B0603020202020204" pitchFamily="34" charset="0"/>
               </a:rPr>
               <a:t>seja</a:t>
             </a:r>
             <a:r>
-              <a:rPr lang="en-US" sz="2400" dirty="0">
+              <a:rPr lang="en-US" sz="2000" dirty="0">
                 <a:latin typeface="Trebuchet MS" panose="020B0603020202020204" pitchFamily="34" charset="0"/>
               </a:rPr>
               <a:t> </a:t>
             </a:r>
             <a:r>
-              <a:rPr lang="en-US" sz="2400" dirty="0" err="1">
+              <a:rPr lang="en-US" sz="2000" dirty="0" err="1">
                 <a:latin typeface="Trebuchet MS" panose="020B0603020202020204" pitchFamily="34" charset="0"/>
               </a:rPr>
               <a:t>pelo</a:t>
             </a:r>
             <a:r>
-              <a:rPr lang="en-US" sz="2400" dirty="0">
+              <a:rPr lang="en-US" sz="2000" dirty="0">
                 <a:latin typeface="Trebuchet MS" panose="020B0603020202020204" pitchFamily="34" charset="0"/>
               </a:rPr>
               <a:t> </a:t>
             </a:r>
             <a:r>
-              <a:rPr lang="en-US" sz="2400" dirty="0" err="1">
+              <a:rPr lang="en-US" sz="2000" dirty="0" err="1">
                 <a:latin typeface="Trebuchet MS" panose="020B0603020202020204" pitchFamily="34" charset="0"/>
               </a:rPr>
               <a:t>número</a:t>
             </a:r>
             <a:r>
-              <a:rPr lang="en-US" sz="2400" dirty="0">
+              <a:rPr lang="en-US" sz="2000" dirty="0">
                 <a:latin typeface="Trebuchet MS" panose="020B0603020202020204" pitchFamily="34" charset="0"/>
               </a:rPr>
               <a:t> </a:t>
             </a:r>
             <a:r>
-              <a:rPr lang="en-US" sz="2400" dirty="0" err="1">
+              <a:rPr lang="en-US" sz="2000" dirty="0" err="1">
                 <a:latin typeface="Trebuchet MS" panose="020B0603020202020204" pitchFamily="34" charset="0"/>
               </a:rPr>
               <a:t>elevado</a:t>
             </a:r>
             <a:r>
-              <a:rPr lang="en-US" sz="2400" dirty="0">
+              <a:rPr lang="en-US" sz="2000" dirty="0">
                 <a:latin typeface="Trebuchet MS" panose="020B0603020202020204" pitchFamily="34" charset="0"/>
               </a:rPr>
               <a:t> de missing values. </a:t>
             </a:r>
             <a:r>
-              <a:rPr lang="en-US" sz="2400" dirty="0" err="1">
+              <a:rPr lang="en-US" sz="2000" dirty="0" err="1">
                 <a:latin typeface="Trebuchet MS" panose="020B0603020202020204" pitchFamily="34" charset="0"/>
               </a:rPr>
               <a:t>Além</a:t>
             </a:r>
             <a:r>
-              <a:rPr lang="en-US" sz="2400" dirty="0">
+              <a:rPr lang="en-US" sz="2000" dirty="0">
                 <a:latin typeface="Trebuchet MS" panose="020B0603020202020204" pitchFamily="34" charset="0"/>
               </a:rPr>
               <a:t> </a:t>
             </a:r>
             <a:r>
-              <a:rPr lang="en-US" sz="2400" dirty="0" err="1">
+              <a:rPr lang="en-US" sz="2000" dirty="0" err="1">
                 <a:latin typeface="Trebuchet MS" panose="020B0603020202020204" pitchFamily="34" charset="0"/>
               </a:rPr>
               <a:t>destas</a:t>
             </a:r>
             <a:r>
-              <a:rPr lang="en-US" sz="2400" dirty="0">
+              <a:rPr lang="en-US" sz="2000" dirty="0">
                 <a:latin typeface="Trebuchet MS" panose="020B0603020202020204" pitchFamily="34" charset="0"/>
               </a:rPr>
               <a:t>, </a:t>
             </a:r>
             <a:r>
-              <a:rPr lang="en-US" sz="2400" dirty="0" err="1">
+              <a:rPr lang="en-US" sz="2000" dirty="0" err="1">
                 <a:latin typeface="Trebuchet MS" panose="020B0603020202020204" pitchFamily="34" charset="0"/>
               </a:rPr>
               <a:t>foram</a:t>
             </a:r>
             <a:r>
-              <a:rPr lang="en-US" sz="2400" dirty="0">
+              <a:rPr lang="en-US" sz="2000" dirty="0">
                 <a:latin typeface="Trebuchet MS" panose="020B0603020202020204" pitchFamily="34" charset="0"/>
               </a:rPr>
               <a:t> </a:t>
             </a:r>
             <a:r>
-              <a:rPr lang="en-US" sz="2400" dirty="0" err="1">
+              <a:rPr lang="en-US" sz="2000" dirty="0" err="1">
                 <a:latin typeface="Trebuchet MS" panose="020B0603020202020204" pitchFamily="34" charset="0"/>
               </a:rPr>
               <a:t>desconsideradas</a:t>
             </a:r>
             <a:r>
-              <a:rPr lang="en-US" sz="2400" dirty="0">
+              <a:rPr lang="en-US" sz="2000" dirty="0">
                 <a:latin typeface="Trebuchet MS" panose="020B0603020202020204" pitchFamily="34" charset="0"/>
               </a:rPr>
               <a:t> </a:t>
             </a:r>
             <a:r>
-              <a:rPr lang="en-US" sz="2400" dirty="0" err="1">
+              <a:rPr lang="en-US" sz="2000" dirty="0" err="1">
                 <a:latin typeface="Trebuchet MS" panose="020B0603020202020204" pitchFamily="34" charset="0"/>
               </a:rPr>
               <a:t>na</a:t>
             </a:r>
             <a:r>
-              <a:rPr lang="en-US" sz="2400" dirty="0">
+              <a:rPr lang="en-US" sz="2000" dirty="0">
                 <a:latin typeface="Trebuchet MS" panose="020B0603020202020204" pitchFamily="34" charset="0"/>
               </a:rPr>
               <a:t> </a:t>
             </a:r>
             <a:r>
-              <a:rPr lang="en-US" sz="2400" dirty="0" err="1">
+              <a:rPr lang="en-US" sz="2000" dirty="0" err="1">
                 <a:latin typeface="Trebuchet MS" panose="020B0603020202020204" pitchFamily="34" charset="0"/>
               </a:rPr>
               <a:t>modelagem</a:t>
             </a:r>
             <a:r>
-              <a:rPr lang="en-US" sz="2400" dirty="0">
+              <a:rPr lang="en-US" sz="2000" dirty="0">
                 <a:latin typeface="Trebuchet MS" panose="020B0603020202020204" pitchFamily="34" charset="0"/>
               </a:rPr>
               <a:t> as </a:t>
             </a:r>
             <a:r>
-              <a:rPr lang="en-US" sz="2400" dirty="0" err="1">
+              <a:rPr lang="en-US" sz="2000" dirty="0" err="1">
                 <a:latin typeface="Trebuchet MS" panose="020B0603020202020204" pitchFamily="34" charset="0"/>
               </a:rPr>
               <a:t>variáveis</a:t>
             </a:r>
             <a:r>
-              <a:rPr lang="en-US" sz="2400" dirty="0">
+              <a:rPr lang="en-US" sz="2000" dirty="0">
                 <a:latin typeface="Trebuchet MS" panose="020B0603020202020204" pitchFamily="34" charset="0"/>
               </a:rPr>
               <a:t> </a:t>
             </a:r>
             <a:r>
-              <a:rPr lang="en-US" sz="2400" dirty="0" err="1">
+              <a:rPr lang="en-US" sz="2000" dirty="0" err="1">
                 <a:latin typeface="Trebuchet MS" panose="020B0603020202020204" pitchFamily="34" charset="0"/>
               </a:rPr>
               <a:t>altitude_low_meters</a:t>
             </a:r>
             <a:r>
-              <a:rPr lang="en-US" sz="2400" dirty="0">
+              <a:rPr lang="en-US" sz="2000" dirty="0">
                 <a:latin typeface="Trebuchet MS" panose="020B0603020202020204" pitchFamily="34" charset="0"/>
               </a:rPr>
               <a:t> e </a:t>
             </a:r>
             <a:r>
-              <a:rPr lang="en-US" sz="2400" dirty="0" err="1">
+              <a:rPr lang="en-US" sz="2000" dirty="0" err="1">
                 <a:latin typeface="Trebuchet MS" panose="020B0603020202020204" pitchFamily="34" charset="0"/>
               </a:rPr>
               <a:t>altitude_high_meters</a:t>
             </a:r>
             <a:r>
-              <a:rPr lang="en-US" sz="2400" dirty="0">
+              <a:rPr lang="en-US" sz="2000" dirty="0">
                 <a:latin typeface="Trebuchet MS" panose="020B0603020202020204" pitchFamily="34" charset="0"/>
               </a:rPr>
               <a:t>, pois </a:t>
             </a:r>
             <a:r>
-              <a:rPr lang="en-US" sz="2400" dirty="0" err="1">
+              <a:rPr lang="en-US" sz="2000" dirty="0" err="1">
                 <a:latin typeface="Trebuchet MS" panose="020B0603020202020204" pitchFamily="34" charset="0"/>
               </a:rPr>
               <a:t>serem</a:t>
             </a:r>
             <a:r>
-              <a:rPr lang="en-US" sz="2400" dirty="0">
+              <a:rPr lang="en-US" sz="2000" dirty="0">
                 <a:latin typeface="Trebuchet MS" panose="020B0603020202020204" pitchFamily="34" charset="0"/>
               </a:rPr>
               <a:t> </a:t>
             </a:r>
             <a:r>
-              <a:rPr lang="en-US" sz="2400" dirty="0" err="1">
+              <a:rPr lang="en-US" sz="2000" dirty="0" err="1">
                 <a:latin typeface="Trebuchet MS" panose="020B0603020202020204" pitchFamily="34" charset="0"/>
               </a:rPr>
               <a:t>informações</a:t>
             </a:r>
             <a:r>
-              <a:rPr lang="en-US" sz="2400" dirty="0">
+              <a:rPr lang="en-US" sz="2000" dirty="0">
                 <a:latin typeface="Trebuchet MS" panose="020B0603020202020204" pitchFamily="34" charset="0"/>
               </a:rPr>
               <a:t> </a:t>
             </a:r>
             <a:r>
-              <a:rPr lang="en-US" sz="2400" dirty="0" err="1">
+              <a:rPr lang="en-US" sz="2000" dirty="0" err="1">
                 <a:latin typeface="Trebuchet MS" panose="020B0603020202020204" pitchFamily="34" charset="0"/>
               </a:rPr>
               <a:t>já</a:t>
             </a:r>
             <a:r>
-              <a:rPr lang="en-US" sz="2400" dirty="0">
+              <a:rPr lang="en-US" sz="2000" dirty="0">
                 <a:latin typeface="Trebuchet MS" panose="020B0603020202020204" pitchFamily="34" charset="0"/>
               </a:rPr>
               <a:t> </a:t>
             </a:r>
             <a:r>
-              <a:rPr lang="en-US" sz="2400" dirty="0" err="1">
+              <a:rPr lang="en-US" sz="2000" dirty="0" err="1">
                 <a:latin typeface="Trebuchet MS" panose="020B0603020202020204" pitchFamily="34" charset="0"/>
               </a:rPr>
               <a:t>constantes</a:t>
             </a:r>
             <a:r>
-              <a:rPr lang="en-US" sz="2400" dirty="0">
+              <a:rPr lang="en-US" sz="2000" dirty="0">
                 <a:latin typeface="Trebuchet MS" panose="020B0603020202020204" pitchFamily="34" charset="0"/>
               </a:rPr>
               <a:t> </a:t>
             </a:r>
             <a:r>
-              <a:rPr lang="en-US" sz="2400" dirty="0" err="1">
+              <a:rPr lang="en-US" sz="2000" dirty="0" err="1">
                 <a:latin typeface="Trebuchet MS" panose="020B0603020202020204" pitchFamily="34" charset="0"/>
               </a:rPr>
               <a:t>na</a:t>
             </a:r>
             <a:r>
-              <a:rPr lang="en-US" sz="2400" dirty="0">
+              <a:rPr lang="en-US" sz="2000" dirty="0">
                 <a:latin typeface="Trebuchet MS" panose="020B0603020202020204" pitchFamily="34" charset="0"/>
               </a:rPr>
               <a:t> </a:t>
             </a:r>
             <a:r>
-              <a:rPr lang="en-US" sz="2400" dirty="0" err="1">
+              <a:rPr lang="en-US" sz="2000" dirty="0" err="1">
                 <a:latin typeface="Trebuchet MS" panose="020B0603020202020204" pitchFamily="34" charset="0"/>
               </a:rPr>
               <a:t>altitude_mean_meters</a:t>
             </a:r>
             <a:r>
-              <a:rPr lang="en-US" sz="2400" dirty="0">
+              <a:rPr lang="en-US" sz="2000" dirty="0">
                 <a:latin typeface="Trebuchet MS" panose="020B0603020202020204" pitchFamily="34" charset="0"/>
               </a:rPr>
               <a:t>.</a:t>
             </a:r>
             <a:br>
-              <a:rPr lang="en-US" sz="2400" dirty="0">
+              <a:rPr lang="en-US" sz="2000" dirty="0">
                 <a:latin typeface="Trebuchet MS" panose="020B0603020202020204" pitchFamily="34" charset="0"/>
               </a:rPr>
             </a:br>
             <a:br>
-              <a:rPr lang="en-US" sz="2400" dirty="0">
+              <a:rPr lang="en-US" sz="2000" dirty="0">
                 <a:latin typeface="Trebuchet MS" panose="020B0603020202020204" pitchFamily="34" charset="0"/>
               </a:rPr>
             </a:br>
             <a:r>
-              <a:rPr lang="en-US" sz="2400" dirty="0">
+              <a:rPr lang="en-US" sz="2000" dirty="0">
                 <a:latin typeface="Trebuchet MS" panose="020B0603020202020204" pitchFamily="34" charset="0"/>
               </a:rPr>
               <a:t>No </a:t>
             </a:r>
             <a:r>
-              <a:rPr lang="en-US" sz="2400" dirty="0" err="1">
+              <a:rPr lang="en-US" sz="2000" dirty="0" err="1">
                 <a:latin typeface="Trebuchet MS" panose="020B0603020202020204" pitchFamily="34" charset="0"/>
               </a:rPr>
               <a:t>mais</a:t>
             </a:r>
             <a:r>
-              <a:rPr lang="en-US" sz="2400" dirty="0">
+              <a:rPr lang="en-US" sz="2000" dirty="0">
                 <a:latin typeface="Trebuchet MS" panose="020B0603020202020204" pitchFamily="34" charset="0"/>
               </a:rPr>
               <a:t>, </a:t>
             </a:r>
             <a:r>
-              <a:rPr lang="en-US" sz="2400" dirty="0" err="1">
+              <a:rPr lang="en-US" sz="2000" dirty="0" err="1">
                 <a:latin typeface="Trebuchet MS" panose="020B0603020202020204" pitchFamily="34" charset="0"/>
               </a:rPr>
               <a:t>informações</a:t>
             </a:r>
             <a:r>
-              <a:rPr lang="en-US" sz="2400" dirty="0">
+              <a:rPr lang="en-US" sz="2000" dirty="0">
                 <a:latin typeface="Trebuchet MS" panose="020B0603020202020204" pitchFamily="34" charset="0"/>
               </a:rPr>
               <a:t> que </a:t>
             </a:r>
             <a:r>
-              <a:rPr lang="en-US" sz="2400" dirty="0" err="1">
+              <a:rPr lang="en-US" sz="2000" dirty="0" err="1">
                 <a:latin typeface="Trebuchet MS" panose="020B0603020202020204" pitchFamily="34" charset="0"/>
               </a:rPr>
               <a:t>poderiam</a:t>
             </a:r>
             <a:r>
-              <a:rPr lang="en-US" sz="2400" dirty="0">
+              <a:rPr lang="en-US" sz="2000" dirty="0">
                 <a:latin typeface="Trebuchet MS" panose="020B0603020202020204" pitchFamily="34" charset="0"/>
               </a:rPr>
               <a:t> ser </a:t>
             </a:r>
             <a:r>
-              <a:rPr lang="en-US" sz="2400" dirty="0" err="1">
+              <a:rPr lang="en-US" sz="2000" dirty="0" err="1">
                 <a:latin typeface="Trebuchet MS" panose="020B0603020202020204" pitchFamily="34" charset="0"/>
               </a:rPr>
               <a:t>relevantes</a:t>
             </a:r>
             <a:r>
-              <a:rPr lang="en-US" sz="2400" dirty="0">
+              <a:rPr lang="en-US" sz="2000" dirty="0">
                 <a:latin typeface="Trebuchet MS" panose="020B0603020202020204" pitchFamily="34" charset="0"/>
               </a:rPr>
               <a:t>, mas que </a:t>
             </a:r>
             <a:r>
-              <a:rPr lang="en-US" sz="2400" dirty="0" err="1">
+              <a:rPr lang="en-US" sz="2000" dirty="0" err="1">
                 <a:latin typeface="Trebuchet MS" panose="020B0603020202020204" pitchFamily="34" charset="0"/>
               </a:rPr>
               <a:t>possuem</a:t>
             </a:r>
             <a:r>
-              <a:rPr lang="en-US" sz="2400" dirty="0">
+              <a:rPr lang="en-US" sz="2000" dirty="0">
                 <a:latin typeface="Trebuchet MS" panose="020B0603020202020204" pitchFamily="34" charset="0"/>
               </a:rPr>
               <a:t> </a:t>
             </a:r>
             <a:r>
-              <a:rPr lang="en-US" sz="2400" dirty="0" err="1">
+              <a:rPr lang="en-US" sz="2000" dirty="0" err="1">
                 <a:latin typeface="Trebuchet MS" panose="020B0603020202020204" pitchFamily="34" charset="0"/>
               </a:rPr>
               <a:t>baixa</a:t>
             </a:r>
             <a:r>
-              <a:rPr lang="en-US" sz="2400" dirty="0">
+              <a:rPr lang="en-US" sz="2000" dirty="0">
                 <a:latin typeface="Trebuchet MS" panose="020B0603020202020204" pitchFamily="34" charset="0"/>
               </a:rPr>
               <a:t> </a:t>
             </a:r>
             <a:r>
-              <a:rPr lang="en-US" sz="2400" dirty="0" err="1">
+              <a:rPr lang="en-US" sz="2000" dirty="0" err="1">
                 <a:latin typeface="Trebuchet MS" panose="020B0603020202020204" pitchFamily="34" charset="0"/>
               </a:rPr>
               <a:t>qualidade</a:t>
             </a:r>
             <a:r>
-              <a:rPr lang="en-US" sz="2400" dirty="0">
+              <a:rPr lang="en-US" sz="2000" dirty="0">
                 <a:latin typeface="Trebuchet MS" panose="020B0603020202020204" pitchFamily="34" charset="0"/>
               </a:rPr>
               <a:t> </a:t>
             </a:r>
             <a:r>
-              <a:rPr lang="en-US" sz="2400" dirty="0" err="1">
+              <a:rPr lang="en-US" sz="2000" dirty="0" err="1">
                 <a:latin typeface="Trebuchet MS" panose="020B0603020202020204" pitchFamily="34" charset="0"/>
               </a:rPr>
               <a:t>também</a:t>
             </a:r>
             <a:r>
-              <a:rPr lang="en-US" sz="2400" dirty="0">
+              <a:rPr lang="en-US" sz="2000" dirty="0">
                 <a:latin typeface="Trebuchet MS" panose="020B0603020202020204" pitchFamily="34" charset="0"/>
               </a:rPr>
               <a:t> </a:t>
             </a:r>
             <a:r>
-              <a:rPr lang="en-US" sz="2400" dirty="0" err="1">
+              <a:rPr lang="en-US" sz="2000" dirty="0" err="1">
                 <a:latin typeface="Trebuchet MS" panose="020B0603020202020204" pitchFamily="34" charset="0"/>
               </a:rPr>
               <a:t>foram</a:t>
             </a:r>
             <a:r>
-              <a:rPr lang="en-US" sz="2400" dirty="0">
+              <a:rPr lang="en-US" sz="2000" dirty="0">
                 <a:latin typeface="Trebuchet MS" panose="020B0603020202020204" pitchFamily="34" charset="0"/>
               </a:rPr>
               <a:t> </a:t>
             </a:r>
             <a:r>
-              <a:rPr lang="en-US" sz="2400" dirty="0" err="1">
+              <a:rPr lang="en-US" sz="2000" dirty="0" err="1">
                 <a:latin typeface="Trebuchet MS" panose="020B0603020202020204" pitchFamily="34" charset="0"/>
               </a:rPr>
               <a:t>descartadas</a:t>
             </a:r>
             <a:r>
-              <a:rPr lang="en-US" sz="2400" dirty="0">
+              <a:rPr lang="en-US" sz="2000" dirty="0">
                 <a:latin typeface="Trebuchet MS" panose="020B0603020202020204" pitchFamily="34" charset="0"/>
               </a:rPr>
               <a:t>: variety (</a:t>
             </a:r>
             <a:r>
-              <a:rPr lang="en-US" sz="2400" dirty="0" err="1">
+              <a:rPr lang="en-US" sz="2000" dirty="0" err="1">
                 <a:latin typeface="Trebuchet MS" panose="020B0603020202020204" pitchFamily="34" charset="0"/>
               </a:rPr>
               <a:t>número</a:t>
             </a:r>
             <a:r>
-              <a:rPr lang="en-US" sz="2400" dirty="0">
+              <a:rPr lang="en-US" sz="2000" dirty="0">
                 <a:latin typeface="Trebuchet MS" panose="020B0603020202020204" pitchFamily="34" charset="0"/>
               </a:rPr>
               <a:t> </a:t>
             </a:r>
             <a:r>
-              <a:rPr lang="en-US" sz="2400" dirty="0" err="1">
+              <a:rPr lang="en-US" sz="2000" dirty="0" err="1">
                 <a:latin typeface="Trebuchet MS" panose="020B0603020202020204" pitchFamily="34" charset="0"/>
               </a:rPr>
               <a:t>elevado</a:t>
             </a:r>
             <a:r>
-              <a:rPr lang="en-US" sz="2400" dirty="0">
+              <a:rPr lang="en-US" sz="2000" dirty="0">
                 <a:latin typeface="Trebuchet MS" panose="020B0603020202020204" pitchFamily="34" charset="0"/>
               </a:rPr>
               <a:t> de missing values) e region (</a:t>
             </a:r>
             <a:r>
-              <a:rPr lang="en-US" sz="2400" dirty="0" err="1">
+              <a:rPr lang="en-US" sz="2000" dirty="0" err="1">
                 <a:latin typeface="Trebuchet MS" panose="020B0603020202020204" pitchFamily="34" charset="0"/>
               </a:rPr>
               <a:t>muitos</a:t>
             </a:r>
             <a:r>
-              <a:rPr lang="en-US" sz="2400" dirty="0">
+              <a:rPr lang="en-US" sz="2000" dirty="0">
                 <a:latin typeface="Trebuchet MS" panose="020B0603020202020204" pitchFamily="34" charset="0"/>
               </a:rPr>
               <a:t> </a:t>
             </a:r>
             <a:r>
-              <a:rPr lang="en-US" sz="2400" dirty="0" err="1">
+              <a:rPr lang="en-US" sz="2000" dirty="0" err="1">
                 <a:latin typeface="Trebuchet MS" panose="020B0603020202020204" pitchFamily="34" charset="0"/>
               </a:rPr>
               <a:t>valores</a:t>
             </a:r>
             <a:r>
-              <a:rPr lang="en-US" sz="2400" dirty="0">
+              <a:rPr lang="en-US" sz="2000" dirty="0">
                 <a:latin typeface="Trebuchet MS" panose="020B0603020202020204" pitchFamily="34" charset="0"/>
               </a:rPr>
               <a:t> </a:t>
             </a:r>
             <a:r>
-              <a:rPr lang="en-US" sz="2400" dirty="0" err="1">
+              <a:rPr lang="en-US" sz="2000" dirty="0" err="1">
                 <a:latin typeface="Trebuchet MS" panose="020B0603020202020204" pitchFamily="34" charset="0"/>
               </a:rPr>
               <a:t>distintos</a:t>
             </a:r>
             <a:r>
-              <a:rPr lang="en-US" sz="2400" dirty="0">
+              <a:rPr lang="en-US" sz="2000" dirty="0">
                 <a:latin typeface="Trebuchet MS" panose="020B0603020202020204" pitchFamily="34" charset="0"/>
               </a:rPr>
               <a:t> e com </a:t>
             </a:r>
             <a:r>
-              <a:rPr lang="en-US" sz="2400" dirty="0" err="1">
+              <a:rPr lang="en-US" sz="2000" dirty="0" err="1">
                 <a:latin typeface="Trebuchet MS" panose="020B0603020202020204" pitchFamily="34" charset="0"/>
               </a:rPr>
               <a:t>informações</a:t>
             </a:r>
             <a:r>
-              <a:rPr lang="en-US" sz="2400" dirty="0">
+              <a:rPr lang="en-US" sz="2000" dirty="0">
                 <a:latin typeface="Trebuchet MS" panose="020B0603020202020204" pitchFamily="34" charset="0"/>
               </a:rPr>
               <a:t> </a:t>
             </a:r>
             <a:r>
-              <a:rPr lang="en-US" sz="2400" dirty="0" err="1">
+              <a:rPr lang="en-US" sz="2000" dirty="0" err="1">
                 <a:latin typeface="Trebuchet MS" panose="020B0603020202020204" pitchFamily="34" charset="0"/>
               </a:rPr>
               <a:t>em</a:t>
             </a:r>
             <a:r>
-              <a:rPr lang="en-US" sz="2400" dirty="0">
+              <a:rPr lang="en-US" sz="2000" dirty="0">
                 <a:latin typeface="Trebuchet MS" panose="020B0603020202020204" pitchFamily="34" charset="0"/>
               </a:rPr>
               <a:t> </a:t>
             </a:r>
             <a:r>
-              <a:rPr lang="en-US" sz="2400" dirty="0" err="1">
+              <a:rPr lang="en-US" sz="2000" dirty="0" err="1">
                 <a:latin typeface="Trebuchet MS" panose="020B0603020202020204" pitchFamily="34" charset="0"/>
               </a:rPr>
               <a:t>caracteres</a:t>
             </a:r>
             <a:r>
-              <a:rPr lang="en-US" sz="2400" dirty="0">
+              <a:rPr lang="en-US" sz="2000" dirty="0">
                 <a:latin typeface="Trebuchet MS" panose="020B0603020202020204" pitchFamily="34" charset="0"/>
               </a:rPr>
               <a:t> que </a:t>
             </a:r>
             <a:r>
-              <a:rPr lang="en-US" sz="2400" dirty="0" err="1">
+              <a:rPr lang="en-US" sz="2000" dirty="0" err="1">
                 <a:latin typeface="Trebuchet MS" panose="020B0603020202020204" pitchFamily="34" charset="0"/>
               </a:rPr>
               <a:t>não</a:t>
             </a:r>
             <a:r>
-              <a:rPr lang="en-US" sz="2400" dirty="0">
+              <a:rPr lang="en-US" sz="2000" dirty="0">
                 <a:latin typeface="Trebuchet MS" panose="020B0603020202020204" pitchFamily="34" charset="0"/>
               </a:rPr>
               <a:t> </a:t>
             </a:r>
             <a:r>
-              <a:rPr lang="en-US" sz="2400" dirty="0" err="1">
+              <a:rPr lang="en-US" sz="2000" dirty="0" err="1">
                 <a:latin typeface="Trebuchet MS" panose="020B0603020202020204" pitchFamily="34" charset="0"/>
               </a:rPr>
               <a:t>são</a:t>
             </a:r>
             <a:r>
-              <a:rPr lang="en-US" sz="2400" dirty="0">
+              <a:rPr lang="en-US" sz="2000" dirty="0">
                 <a:latin typeface="Trebuchet MS" panose="020B0603020202020204" pitchFamily="34" charset="0"/>
               </a:rPr>
               <a:t> do </a:t>
             </a:r>
             <a:r>
-              <a:rPr lang="en-US" sz="2400" dirty="0" err="1">
+              <a:rPr lang="en-US" sz="2000" dirty="0" err="1">
                 <a:latin typeface="Trebuchet MS" panose="020B0603020202020204" pitchFamily="34" charset="0"/>
               </a:rPr>
               <a:t>alfabeto</a:t>
             </a:r>
             <a:r>
-              <a:rPr lang="en-US" sz="2400" dirty="0">
+              <a:rPr lang="en-US" sz="2000" dirty="0">
                 <a:latin typeface="Trebuchet MS" panose="020B0603020202020204" pitchFamily="34" charset="0"/>
               </a:rPr>
               <a:t> </a:t>
             </a:r>
             <a:r>
-              <a:rPr lang="en-US" sz="2400" dirty="0" err="1">
+              <a:rPr lang="en-US" sz="2000" dirty="0" err="1">
                 <a:latin typeface="Trebuchet MS" panose="020B0603020202020204" pitchFamily="34" charset="0"/>
               </a:rPr>
               <a:t>ocidental</a:t>
             </a:r>
             <a:r>
-              <a:rPr lang="en-US" sz="2400" dirty="0">
+              <a:rPr lang="en-US" sz="2000" dirty="0">
                 <a:latin typeface="Trebuchet MS" panose="020B0603020202020204" pitchFamily="34" charset="0"/>
               </a:rPr>
               <a:t>).</a:t>
             </a:r>
-            <a:endParaRPr lang="pt-BR" sz="2400" dirty="0">
+            <a:endParaRPr lang="pt-BR" sz="2000" dirty="0">
               <a:latin typeface="Trebuchet MS" panose="020B0603020202020204" pitchFamily="34" charset="0"/>
             </a:endParaRPr>
           </a:p>

</xml_diff>

<commit_message>
PPT e Excel finais
criei um novo excel (final blackboard) para subir no blackboard
</commit_message>
<xml_diff>
--- a/ProjetoFinal_Avaliacao_de_Cafes.pptx
+++ b/ProjetoFinal_Avaliacao_de_Cafes.pptx
@@ -5281,7 +5281,19 @@
               <a:rPr lang="pt-BR" sz="2000" dirty="0">
                 <a:latin typeface="Trebuchet MS" panose="020B0603020202020204" pitchFamily="34" charset="0"/>
               </a:rPr>
-              <a:t>Essas variáveis foram mantidas, pois possuem informações consideradas na pontuação de cada café (</a:t>
+              <a:t>As variáveis relacionadas à qualidade </a:t>
+            </a:r>
+            <a:r>
+              <a:rPr lang="pt-BR" sz="2000">
+                <a:latin typeface="Trebuchet MS" panose="020B0603020202020204" pitchFamily="34" charset="0"/>
+              </a:rPr>
+              <a:t>do café </a:t>
+            </a:r>
+            <a:r>
+              <a:rPr lang="pt-BR" sz="2000" dirty="0">
+                <a:latin typeface="Trebuchet MS" panose="020B0603020202020204" pitchFamily="34" charset="0"/>
+              </a:rPr>
+              <a:t>foram mantidas, pois possuem informações consideradas na pontuação de cada café (</a:t>
             </a:r>
             <a:r>
               <a:rPr lang="en-US" sz="2000" dirty="0">
@@ -6182,7 +6194,7 @@
               <a:rPr lang="en-US" sz="2000" dirty="0">
                 <a:latin typeface="Trebuchet MS" panose="020B0603020202020204" pitchFamily="34" charset="0"/>
               </a:rPr>
-              <a:t> </a:t>
+              <a:t>, </a:t>
             </a:r>
             <a:r>
               <a:rPr lang="en-US" sz="2000" dirty="0" err="1">

</xml_diff>